<commit_message>
deleteclients/orders/vendor inventory and updated readme and ppt
</commit_message>
<xml_diff>
--- a/P1 presentation.pptx
+++ b/P1 presentation.pptx
@@ -3964,7 +3964,7 @@
             </a:pPr>
             <a:r>
               <a:rPr lang="en-US" sz="3200" dirty="0"/>
-              <a:t>View client list</a:t>
+              <a:t>Delete clients, orders, vendor inventory</a:t>
             </a:r>
           </a:p>
           <a:p>
@@ -3974,7 +3974,7 @@
             </a:pPr>
             <a:r>
               <a:rPr lang="en-US" sz="3200" dirty="0"/>
-              <a:t>View vendor info</a:t>
+              <a:t>View client info, totals, subtotals, items not found</a:t>
             </a:r>
           </a:p>
           <a:p>
@@ -3984,7 +3984,7 @@
             </a:pPr>
             <a:r>
               <a:rPr lang="en-US" sz="3200" dirty="0"/>
-              <a:t>View expense and items not found report</a:t>
+              <a:t>Read in excel clients to database</a:t>
             </a:r>
           </a:p>
           <a:p>
@@ -3994,7 +3994,7 @@
             </a:pPr>
             <a:r>
               <a:rPr lang="en-US" sz="3200" dirty="0"/>
-              <a:t>Read in excel clients to database</a:t>
+              <a:t>Read in test excel vendor to database</a:t>
             </a:r>
           </a:p>
           <a:p>
@@ -4003,28 +4003,12 @@
               <a:buChar char="ü"/>
             </a:pPr>
             <a:r>
+              <a:rPr lang="en-US" sz="3200"/>
+              <a:t>Error </a:t>
+            </a:r>
+            <a:r>
               <a:rPr lang="en-US" sz="3200" dirty="0"/>
-              <a:t>Read in excel vendors to database</a:t>
-            </a:r>
-          </a:p>
-          <a:p>
-            <a:pPr>
-              <a:buFont typeface="Wingdings" panose="05000000000000000000" pitchFamily="2" charset="2"/>
-              <a:buChar char="ü"/>
-            </a:pPr>
-            <a:r>
-              <a:rPr lang="en-US" sz="3200" dirty="0"/>
-              <a:t>Delete all records from all tables</a:t>
-            </a:r>
-          </a:p>
-          <a:p>
-            <a:pPr>
-              <a:buFont typeface="Wingdings" panose="05000000000000000000" pitchFamily="2" charset="2"/>
-              <a:buChar char="ü"/>
-            </a:pPr>
-            <a:r>
-              <a:rPr lang="en-US" sz="3200" dirty="0"/>
-              <a:t>Error handling for adding clients</a:t>
+              <a:t>handling for adding clients</a:t>
             </a:r>
             <a:endParaRPr lang="en-US" sz="3000" dirty="0"/>
           </a:p>

</xml_diff>

<commit_message>
readme and ppt update
</commit_message>
<xml_diff>
--- a/P1 presentation.pptx
+++ b/P1 presentation.pptx
@@ -10,12 +10,13 @@
     <p:sldId id="268" r:id="rId4"/>
     <p:sldId id="267" r:id="rId5"/>
     <p:sldId id="261" r:id="rId6"/>
-    <p:sldId id="262" r:id="rId7"/>
-    <p:sldId id="266" r:id="rId8"/>
-    <p:sldId id="258" r:id="rId9"/>
-    <p:sldId id="259" r:id="rId10"/>
-    <p:sldId id="263" r:id="rId11"/>
-    <p:sldId id="265" r:id="rId12"/>
+    <p:sldId id="269" r:id="rId7"/>
+    <p:sldId id="262" r:id="rId8"/>
+    <p:sldId id="266" r:id="rId9"/>
+    <p:sldId id="258" r:id="rId10"/>
+    <p:sldId id="259" r:id="rId11"/>
+    <p:sldId id="263" r:id="rId12"/>
+    <p:sldId id="265" r:id="rId13"/>
   </p:sldIdLst>
   <p:sldSz cx="12192000" cy="6858000"/>
   <p:notesSz cx="6858000" cy="9144000"/>
@@ -3888,6 +3889,14 @@
 <file path=ppt/slides/slide10.xml><?xml version="1.0" encoding="utf-8"?>
 <p:sld xmlns:a="http://schemas.openxmlformats.org/drawingml/2006/main" xmlns:r="http://schemas.openxmlformats.org/officeDocument/2006/relationships" xmlns:p="http://schemas.openxmlformats.org/presentationml/2006/main">
   <p:cSld>
+    <p:bg>
+      <p:bgPr>
+        <a:solidFill>
+          <a:schemeClr val="bg1"/>
+        </a:solidFill>
+        <a:effectLst/>
+      </p:bgPr>
+    </p:bg>
     <p:spTree>
       <p:nvGrpSpPr>
         <p:cNvPr id="1" name=""/>
@@ -3902,6 +3911,589 @@
           <a:chExt cx="0" cy="0"/>
         </a:xfrm>
       </p:grpSpPr>
+      <p:sp useBgFill="1">
+        <p:nvSpPr>
+          <p:cNvPr id="8" name="Rectangle 7">
+            <a:extLst>
+              <a:ext uri="{FF2B5EF4-FFF2-40B4-BE49-F238E27FC236}">
+                <a16:creationId xmlns:a16="http://schemas.microsoft.com/office/drawing/2014/main" id="{3741B58E-3B65-4A01-A276-975AB2CF8A08}"/>
+              </a:ext>
+              <a:ext uri="{C183D7F6-B498-43B3-948B-1728B52AA6E4}">
+                <adec:decorative xmlns:adec="http://schemas.microsoft.com/office/drawing/2017/decorative" val="1"/>
+              </a:ext>
+            </a:extLst>
+          </p:cNvPr>
+          <p:cNvSpPr>
+            <a:spLocks noGrp="1" noRot="1" noChangeAspect="1" noMove="1" noResize="1" noEditPoints="1" noAdjustHandles="1" noChangeArrowheads="1" noChangeShapeType="1" noTextEdit="1"/>
+          </p:cNvSpPr>
+          <p:nvPr>
+            <p:extLst>
+              <p:ext uri="{386F3935-93C4-4BCD-93E2-E3B085C9AB24}">
+                <p16:designElem xmlns:p16="http://schemas.microsoft.com/office/powerpoint/2015/main" val="1"/>
+              </p:ext>
+            </p:extLst>
+          </p:nvPr>
+        </p:nvSpPr>
+        <p:spPr>
+          <a:xfrm>
+            <a:off x="0" y="0"/>
+            <a:ext cx="12186315" cy="6858000"/>
+          </a:xfrm>
+          <a:prstGeom prst="rect">
+            <a:avLst/>
+          </a:prstGeom>
+          <a:ln>
+            <a:noFill/>
+          </a:ln>
+        </p:spPr>
+        <p:style>
+          <a:lnRef idx="2">
+            <a:schemeClr val="accent6">
+              <a:shade val="50000"/>
+            </a:schemeClr>
+          </a:lnRef>
+          <a:fillRef idx="1001">
+            <a:schemeClr val="lt1"/>
+          </a:fillRef>
+          <a:effectRef idx="0">
+            <a:schemeClr val="accent6"/>
+          </a:effectRef>
+          <a:fontRef idx="minor">
+            <a:schemeClr val="lt1"/>
+          </a:fontRef>
+        </p:style>
+        <p:txBody>
+          <a:bodyPr rtlCol="0" anchor="ctr"/>
+          <a:lstStyle/>
+          <a:p>
+            <a:pPr algn="ctr"/>
+            <a:endParaRPr lang="en-US"/>
+          </a:p>
+        </p:txBody>
+      </p:sp>
+      <p:sp>
+        <p:nvSpPr>
+          <p:cNvPr id="10" name="Rectangle 9">
+            <a:extLst>
+              <a:ext uri="{FF2B5EF4-FFF2-40B4-BE49-F238E27FC236}">
+                <a16:creationId xmlns:a16="http://schemas.microsoft.com/office/drawing/2014/main" id="{7AAC67C3-831B-4AB1-A259-DFB839CAFAFC}"/>
+              </a:ext>
+              <a:ext uri="{C183D7F6-B498-43B3-948B-1728B52AA6E4}">
+                <adec:decorative xmlns:adec="http://schemas.microsoft.com/office/drawing/2017/decorative" val="1"/>
+              </a:ext>
+            </a:extLst>
+          </p:cNvPr>
+          <p:cNvSpPr>
+            <a:spLocks noGrp="1" noRot="1" noChangeAspect="1" noMove="1" noResize="1" noEditPoints="1" noAdjustHandles="1" noChangeArrowheads="1" noChangeShapeType="1" noTextEdit="1"/>
+          </p:cNvSpPr>
+          <p:nvPr>
+            <p:extLst>
+              <p:ext uri="{386F3935-93C4-4BCD-93E2-E3B085C9AB24}">
+                <p16:designElem xmlns:p16="http://schemas.microsoft.com/office/powerpoint/2015/main" val="1"/>
+              </p:ext>
+            </p:extLst>
+          </p:nvPr>
+        </p:nvSpPr>
+        <p:spPr>
+          <a:xfrm>
+            <a:off x="16" y="0"/>
+            <a:ext cx="4050791" cy="6858000"/>
+          </a:xfrm>
+          <a:prstGeom prst="rect">
+            <a:avLst/>
+          </a:prstGeom>
+          <a:solidFill>
+            <a:schemeClr val="accent2"/>
+          </a:solidFill>
+          <a:ln>
+            <a:noFill/>
+          </a:ln>
+        </p:spPr>
+        <p:style>
+          <a:lnRef idx="2">
+            <a:schemeClr val="accent1">
+              <a:shade val="50000"/>
+            </a:schemeClr>
+          </a:lnRef>
+          <a:fillRef idx="1">
+            <a:schemeClr val="accent1"/>
+          </a:fillRef>
+          <a:effectRef idx="0">
+            <a:schemeClr val="accent1"/>
+          </a:effectRef>
+          <a:fontRef idx="minor">
+            <a:schemeClr val="lt1"/>
+          </a:fontRef>
+        </p:style>
+      </p:sp>
+      <p:sp>
+        <p:nvSpPr>
+          <p:cNvPr id="12" name="Rectangle 11">
+            <a:extLst>
+              <a:ext uri="{FF2B5EF4-FFF2-40B4-BE49-F238E27FC236}">
+                <a16:creationId xmlns:a16="http://schemas.microsoft.com/office/drawing/2014/main" id="{054B3F04-9EAC-45C0-B3CE-0387EEA10A0C}"/>
+              </a:ext>
+              <a:ext uri="{C183D7F6-B498-43B3-948B-1728B52AA6E4}">
+                <adec:decorative xmlns:adec="http://schemas.microsoft.com/office/drawing/2017/decorative" val="1"/>
+              </a:ext>
+            </a:extLst>
+          </p:cNvPr>
+          <p:cNvSpPr>
+            <a:spLocks noGrp="1" noRot="1" noChangeAspect="1" noMove="1" noResize="1" noEditPoints="1" noAdjustHandles="1" noChangeArrowheads="1" noChangeShapeType="1" noTextEdit="1"/>
+          </p:cNvSpPr>
+          <p:nvPr>
+            <p:extLst>
+              <p:ext uri="{386F3935-93C4-4BCD-93E2-E3B085C9AB24}">
+                <p16:designElem xmlns:p16="http://schemas.microsoft.com/office/powerpoint/2015/main" val="1"/>
+              </p:ext>
+            </p:extLst>
+          </p:nvPr>
+        </p:nvSpPr>
+        <p:spPr>
+          <a:xfrm>
+            <a:off x="4040071" y="0"/>
+            <a:ext cx="64008" cy="6858000"/>
+          </a:xfrm>
+          <a:prstGeom prst="rect">
+            <a:avLst/>
+          </a:prstGeom>
+          <a:solidFill>
+            <a:schemeClr val="accent1"/>
+          </a:solidFill>
+          <a:ln>
+            <a:noFill/>
+          </a:ln>
+        </p:spPr>
+        <p:style>
+          <a:lnRef idx="2">
+            <a:schemeClr val="accent1">
+              <a:shade val="50000"/>
+            </a:schemeClr>
+          </a:lnRef>
+          <a:fillRef idx="1">
+            <a:schemeClr val="accent1"/>
+          </a:fillRef>
+          <a:effectRef idx="0">
+            <a:schemeClr val="accent1"/>
+          </a:effectRef>
+          <a:fontRef idx="minor">
+            <a:schemeClr val="lt1"/>
+          </a:fontRef>
+        </p:style>
+      </p:sp>
+      <p:sp>
+        <p:nvSpPr>
+          <p:cNvPr id="9" name="Title 1">
+            <a:extLst>
+              <a:ext uri="{FF2B5EF4-FFF2-40B4-BE49-F238E27FC236}">
+                <a16:creationId xmlns:a16="http://schemas.microsoft.com/office/drawing/2014/main" id="{CCB9A958-AEDA-470C-AB64-69CBC762D266}"/>
+              </a:ext>
+            </a:extLst>
+          </p:cNvPr>
+          <p:cNvSpPr>
+            <a:spLocks noGrp="1"/>
+          </p:cNvSpPr>
+          <p:nvPr>
+            <p:ph type="title"/>
+          </p:nvPr>
+        </p:nvSpPr>
+        <p:spPr>
+          <a:xfrm>
+            <a:off x="492371" y="104944"/>
+            <a:ext cx="3494428" cy="2103875"/>
+          </a:xfrm>
+        </p:spPr>
+        <p:txBody>
+          <a:bodyPr>
+            <a:normAutofit/>
+          </a:bodyPr>
+          <a:lstStyle/>
+          <a:p>
+            <a:r>
+              <a:rPr lang="en-US" sz="4400" dirty="0">
+                <a:solidFill>
+                  <a:srgbClr val="FFFFFF"/>
+                </a:solidFill>
+              </a:rPr>
+              <a:t>Feature: </a:t>
+            </a:r>
+            <a:br>
+              <a:rPr lang="en-US" sz="4400" dirty="0">
+                <a:solidFill>
+                  <a:srgbClr val="FFFFFF"/>
+                </a:solidFill>
+              </a:rPr>
+            </a:br>
+            <a:r>
+              <a:rPr lang="en-US" sz="4400" dirty="0">
+                <a:solidFill>
+                  <a:srgbClr val="FFFFFF"/>
+                </a:solidFill>
+              </a:rPr>
+              <a:t>View Subtotals</a:t>
+            </a:r>
+          </a:p>
+        </p:txBody>
+      </p:sp>
+      <p:sp>
+        <p:nvSpPr>
+          <p:cNvPr id="14" name="TextBox 13">
+            <a:extLst>
+              <a:ext uri="{FF2B5EF4-FFF2-40B4-BE49-F238E27FC236}">
+                <a16:creationId xmlns:a16="http://schemas.microsoft.com/office/drawing/2014/main" id="{70159E9E-BB50-49C4-B976-0F3D58B93E30}"/>
+              </a:ext>
+            </a:extLst>
+          </p:cNvPr>
+          <p:cNvSpPr txBox="1"/>
+          <p:nvPr/>
+        </p:nvSpPr>
+        <p:spPr>
+          <a:xfrm>
+            <a:off x="6093157" y="50198"/>
+            <a:ext cx="1698530" cy="954107"/>
+          </a:xfrm>
+          <a:prstGeom prst="rect">
+            <a:avLst/>
+          </a:prstGeom>
+          <a:noFill/>
+        </p:spPr>
+        <p:txBody>
+          <a:bodyPr wrap="square" rtlCol="0">
+            <a:spAutoFit/>
+          </a:bodyPr>
+          <a:lstStyle/>
+          <a:p>
+            <a:r>
+              <a:rPr lang="en-US" sz="2800" dirty="0"/>
+              <a:t>SQL</a:t>
+            </a:r>
+          </a:p>
+          <a:p>
+            <a:endParaRPr lang="en-US" sz="2800" dirty="0"/>
+          </a:p>
+        </p:txBody>
+      </p:sp>
+      <p:sp>
+        <p:nvSpPr>
+          <p:cNvPr id="16" name="TextBox 15">
+            <a:extLst>
+              <a:ext uri="{FF2B5EF4-FFF2-40B4-BE49-F238E27FC236}">
+                <a16:creationId xmlns:a16="http://schemas.microsoft.com/office/drawing/2014/main" id="{96CE5BCA-33D8-4189-9E0F-FDAF3C7358AB}"/>
+              </a:ext>
+            </a:extLst>
+          </p:cNvPr>
+          <p:cNvSpPr txBox="1"/>
+          <p:nvPr/>
+        </p:nvSpPr>
+        <p:spPr>
+          <a:xfrm>
+            <a:off x="6064072" y="3308129"/>
+            <a:ext cx="2298255" cy="523220"/>
+          </a:xfrm>
+          <a:prstGeom prst="rect">
+            <a:avLst/>
+          </a:prstGeom>
+          <a:noFill/>
+        </p:spPr>
+        <p:txBody>
+          <a:bodyPr wrap="square" rtlCol="0">
+            <a:spAutoFit/>
+          </a:bodyPr>
+          <a:lstStyle/>
+          <a:p>
+            <a:r>
+              <a:rPr lang="en-US" sz="2800" dirty="0"/>
+              <a:t>UiPath Output</a:t>
+            </a:r>
+          </a:p>
+        </p:txBody>
+      </p:sp>
+      <p:cxnSp>
+        <p:nvCxnSpPr>
+          <p:cNvPr id="3" name="Straight Arrow Connector 2">
+            <a:extLst>
+              <a:ext uri="{FF2B5EF4-FFF2-40B4-BE49-F238E27FC236}">
+                <a16:creationId xmlns:a16="http://schemas.microsoft.com/office/drawing/2014/main" id="{E3769150-044B-4E69-9F0B-233BF8BFA682}"/>
+              </a:ext>
+            </a:extLst>
+          </p:cNvPr>
+          <p:cNvCxnSpPr/>
+          <p:nvPr/>
+        </p:nvCxnSpPr>
+        <p:spPr>
+          <a:xfrm>
+            <a:off x="4566130" y="3523906"/>
+            <a:ext cx="1295400" cy="0"/>
+          </a:xfrm>
+          <a:prstGeom prst="straightConnector1">
+            <a:avLst/>
+          </a:prstGeom>
+          <a:ln w="57150">
+            <a:solidFill>
+              <a:srgbClr val="FF0000"/>
+            </a:solidFill>
+            <a:tailEnd type="triangle"/>
+          </a:ln>
+        </p:spPr>
+        <p:style>
+          <a:lnRef idx="1">
+            <a:schemeClr val="dk1"/>
+          </a:lnRef>
+          <a:fillRef idx="0">
+            <a:schemeClr val="dk1"/>
+          </a:fillRef>
+          <a:effectRef idx="0">
+            <a:schemeClr val="dk1"/>
+          </a:effectRef>
+          <a:fontRef idx="minor">
+            <a:schemeClr val="tx1"/>
+          </a:fontRef>
+        </p:style>
+      </p:cxnSp>
+      <p:sp>
+        <p:nvSpPr>
+          <p:cNvPr id="13" name="TextBox 12">
+            <a:extLst>
+              <a:ext uri="{FF2B5EF4-FFF2-40B4-BE49-F238E27FC236}">
+                <a16:creationId xmlns:a16="http://schemas.microsoft.com/office/drawing/2014/main" id="{3CDDD439-3FC7-4D2D-8AF4-9BD220B88AA6}"/>
+              </a:ext>
+            </a:extLst>
+          </p:cNvPr>
+          <p:cNvSpPr txBox="1"/>
+          <p:nvPr/>
+        </p:nvSpPr>
+        <p:spPr>
+          <a:xfrm>
+            <a:off x="6093157" y="566678"/>
+            <a:ext cx="5606472" cy="2862322"/>
+          </a:xfrm>
+          <a:prstGeom prst="rect">
+            <a:avLst/>
+          </a:prstGeom>
+          <a:noFill/>
+          <a:ln>
+            <a:solidFill>
+              <a:schemeClr val="tx1"/>
+            </a:solidFill>
+          </a:ln>
+        </p:spPr>
+        <p:txBody>
+          <a:bodyPr wrap="square" rtlCol="0">
+            <a:spAutoFit/>
+          </a:bodyPr>
+          <a:lstStyle/>
+          <a:p>
+            <a:r>
+              <a:rPr lang="en-US" dirty="0"/>
+              <a:t>"select </a:t>
+            </a:r>
+            <a:r>
+              <a:rPr lang="en-US" dirty="0" err="1"/>
+              <a:t>orders.ordernumber,clients.clientname</a:t>
+            </a:r>
+            <a:r>
+              <a:rPr lang="en-US" dirty="0"/>
+              <a:t>, shoppinglist.clientorder,shoppingexpense.price,shoppinglist.clientquantity,shoppingexpense.subtotal</a:t>
+            </a:r>
+          </a:p>
+          <a:p>
+            <a:r>
+              <a:rPr lang="en-US" dirty="0"/>
+              <a:t>from orders</a:t>
+            </a:r>
+          </a:p>
+          <a:p>
+            <a:r>
+              <a:rPr lang="en-US" dirty="0"/>
+              <a:t>inner join clients on </a:t>
+            </a:r>
+            <a:r>
+              <a:rPr lang="en-US" dirty="0" err="1"/>
+              <a:t>orders.clientid</a:t>
+            </a:r>
+            <a:r>
+              <a:rPr lang="en-US" dirty="0"/>
+              <a:t> = </a:t>
+            </a:r>
+            <a:r>
+              <a:rPr lang="en-US" dirty="0" err="1"/>
+              <a:t>clients.clientid</a:t>
+            </a:r>
+            <a:endParaRPr lang="en-US" dirty="0"/>
+          </a:p>
+          <a:p>
+            <a:r>
+              <a:rPr lang="en-US" dirty="0"/>
+              <a:t>inner join </a:t>
+            </a:r>
+            <a:r>
+              <a:rPr lang="en-US" dirty="0" err="1"/>
+              <a:t>shoppingexpense</a:t>
+            </a:r>
+            <a:r>
+              <a:rPr lang="en-US" dirty="0"/>
+              <a:t> on </a:t>
+            </a:r>
+            <a:r>
+              <a:rPr lang="en-US" dirty="0" err="1"/>
+              <a:t>shoppingexpense.ordernumber</a:t>
+            </a:r>
+            <a:r>
+              <a:rPr lang="en-US" dirty="0"/>
+              <a:t> = </a:t>
+            </a:r>
+            <a:r>
+              <a:rPr lang="en-US" dirty="0" err="1"/>
+              <a:t>orders.ordernumber</a:t>
+            </a:r>
+            <a:endParaRPr lang="en-US" dirty="0"/>
+          </a:p>
+          <a:p>
+            <a:r>
+              <a:rPr lang="en-US" dirty="0"/>
+              <a:t>inner join </a:t>
+            </a:r>
+            <a:r>
+              <a:rPr lang="en-US" dirty="0" err="1"/>
+              <a:t>shoppinglist</a:t>
+            </a:r>
+            <a:r>
+              <a:rPr lang="en-US" dirty="0"/>
+              <a:t> on </a:t>
+            </a:r>
+            <a:r>
+              <a:rPr lang="en-US" dirty="0" err="1"/>
+              <a:t>shoppinglist.itemID</a:t>
+            </a:r>
+            <a:r>
+              <a:rPr lang="en-US" dirty="0"/>
+              <a:t> = </a:t>
+            </a:r>
+            <a:r>
+              <a:rPr lang="en-US" dirty="0" err="1"/>
+              <a:t>shoppingexpense.itemID</a:t>
+            </a:r>
+            <a:endParaRPr lang="en-US" dirty="0"/>
+          </a:p>
+          <a:p>
+            <a:r>
+              <a:rPr lang="en-US" dirty="0"/>
+              <a:t>order by </a:t>
+            </a:r>
+            <a:r>
+              <a:rPr lang="en-US" dirty="0" err="1"/>
+              <a:t>ordernumber</a:t>
+            </a:r>
+            <a:r>
+              <a:rPr lang="en-US" dirty="0"/>
+              <a:t> </a:t>
+            </a:r>
+            <a:r>
+              <a:rPr lang="en-US" dirty="0" err="1"/>
+              <a:t>asc</a:t>
+            </a:r>
+            <a:r>
+              <a:rPr lang="en-US" dirty="0"/>
+              <a:t>;"</a:t>
+            </a:r>
+          </a:p>
+        </p:txBody>
+      </p:sp>
+      <p:pic>
+        <p:nvPicPr>
+          <p:cNvPr id="18" name="Picture 17">
+            <a:extLst>
+              <a:ext uri="{FF2B5EF4-FFF2-40B4-BE49-F238E27FC236}">
+                <a16:creationId xmlns:a16="http://schemas.microsoft.com/office/drawing/2014/main" id="{581EE854-8AA8-4DD7-B0BD-16B90DCEDF45}"/>
+              </a:ext>
+            </a:extLst>
+          </p:cNvPr>
+          <p:cNvPicPr>
+            <a:picLocks noChangeAspect="1"/>
+          </p:cNvPicPr>
+          <p:nvPr/>
+        </p:nvPicPr>
+        <p:blipFill>
+          <a:blip r:embed="rId2"/>
+          <a:stretch>
+            <a:fillRect/>
+          </a:stretch>
+        </p:blipFill>
+        <p:spPr>
+          <a:xfrm>
+            <a:off x="6093157" y="3945480"/>
+            <a:ext cx="5857599" cy="2074320"/>
+          </a:xfrm>
+          <a:prstGeom prst="rect">
+            <a:avLst/>
+          </a:prstGeom>
+          <a:ln>
+            <a:solidFill>
+              <a:schemeClr val="tx1"/>
+            </a:solidFill>
+          </a:ln>
+        </p:spPr>
+      </p:pic>
+      <p:pic>
+        <p:nvPicPr>
+          <p:cNvPr id="20" name="Picture 19">
+            <a:extLst>
+              <a:ext uri="{FF2B5EF4-FFF2-40B4-BE49-F238E27FC236}">
+                <a16:creationId xmlns:a16="http://schemas.microsoft.com/office/drawing/2014/main" id="{F08DDB26-7F71-425C-8FFF-639F9EF1BBBF}"/>
+              </a:ext>
+            </a:extLst>
+          </p:cNvPr>
+          <p:cNvPicPr>
+            <a:picLocks noChangeAspect="1"/>
+          </p:cNvPicPr>
+          <p:nvPr/>
+        </p:nvPicPr>
+        <p:blipFill>
+          <a:blip r:embed="rId3"/>
+          <a:stretch>
+            <a:fillRect/>
+          </a:stretch>
+        </p:blipFill>
+        <p:spPr>
+          <a:xfrm>
+            <a:off x="10432" y="2320068"/>
+            <a:ext cx="4363588" cy="4543265"/>
+          </a:xfrm>
+          <a:prstGeom prst="rect">
+            <a:avLst/>
+          </a:prstGeom>
+        </p:spPr>
+      </p:pic>
+    </p:spTree>
+    <p:extLst>
+      <p:ext uri="{BB962C8B-B14F-4D97-AF65-F5344CB8AC3E}">
+        <p14:creationId xmlns:p14="http://schemas.microsoft.com/office/powerpoint/2010/main" val="2934159058"/>
+      </p:ext>
+    </p:extLst>
+  </p:cSld>
+  <p:clrMapOvr>
+    <a:masterClrMapping/>
+  </p:clrMapOvr>
+</p:sld>
+</file>
+
+<file path=ppt/slides/slide11.xml><?xml version="1.0" encoding="utf-8"?>
+<p:sld xmlns:a="http://schemas.openxmlformats.org/drawingml/2006/main" xmlns:r="http://schemas.openxmlformats.org/officeDocument/2006/relationships" xmlns:p="http://schemas.openxmlformats.org/presentationml/2006/main">
+  <p:cSld>
+    <p:spTree>
+      <p:nvGrpSpPr>
+        <p:cNvPr id="1" name=""/>
+        <p:cNvGrpSpPr/>
+        <p:nvPr/>
+      </p:nvGrpSpPr>
+      <p:grpSpPr>
+        <a:xfrm>
+          <a:off x="0" y="0"/>
+          <a:ext cx="0" cy="0"/>
+          <a:chOff x="0" y="0"/>
+          <a:chExt cx="0" cy="0"/>
+        </a:xfrm>
+      </p:grpSpPr>
       <p:sp>
         <p:nvSpPr>
           <p:cNvPr id="2" name="Title 1">
@@ -3955,7 +4547,9 @@
           </a:xfrm>
         </p:spPr>
         <p:txBody>
-          <a:bodyPr/>
+          <a:bodyPr>
+            <a:normAutofit/>
+          </a:bodyPr>
           <a:lstStyle/>
           <a:p>
             <a:pPr>
@@ -4004,15 +4598,28 @@
             </a:pPr>
             <a:r>
               <a:rPr lang="en-US" sz="3200" dirty="0"/>
-              <a:t>Error handling for adding clients</a:t>
-            </a:r>
-            <a:endParaRPr lang="en-US" sz="3000" dirty="0"/>
-          </a:p>
-          <a:p>
-            <a:pPr>
+              <a:t>Error handling </a:t>
+            </a:r>
+          </a:p>
+          <a:p>
+            <a:pPr lvl="1">
               <a:buFont typeface="Wingdings" panose="05000000000000000000" pitchFamily="2" charset="2"/>
               <a:buChar char="ü"/>
             </a:pPr>
+            <a:r>
+              <a:rPr lang="en-US" sz="3000" dirty="0"/>
+              <a:t>For adding clients</a:t>
+            </a:r>
+          </a:p>
+          <a:p>
+            <a:pPr lvl="1">
+              <a:buFont typeface="Wingdings" panose="05000000000000000000" pitchFamily="2" charset="2"/>
+              <a:buChar char="ü"/>
+            </a:pPr>
+            <a:r>
+              <a:rPr lang="en-US" sz="2800" dirty="0"/>
+              <a:t>Dedicated sequence to handle an edge case to send out of stock emails to clients whose entire order was out of stock/unavailable. </a:t>
+            </a:r>
             <a:endParaRPr lang="en-US" sz="3200" dirty="0"/>
           </a:p>
           <a:p>
@@ -4068,7 +4675,7 @@
 </p:sld>
 </file>
 
-<file path=ppt/slides/slide11.xml><?xml version="1.0" encoding="utf-8"?>
+<file path=ppt/slides/slide12.xml><?xml version="1.0" encoding="utf-8"?>
 <p:sld xmlns:a="http://schemas.openxmlformats.org/drawingml/2006/main" xmlns:r="http://schemas.openxmlformats.org/officeDocument/2006/relationships" xmlns:p="http://schemas.openxmlformats.org/presentationml/2006/main">
   <p:cSld>
     <p:bg>
@@ -5435,6 +6042,96 @@
           </a:effectLst>
         </p:spPr>
       </p:pic>
+      <p:sp>
+        <p:nvSpPr>
+          <p:cNvPr id="8" name="Title 1">
+            <a:extLst>
+              <a:ext uri="{FF2B5EF4-FFF2-40B4-BE49-F238E27FC236}">
+                <a16:creationId xmlns:a16="http://schemas.microsoft.com/office/drawing/2014/main" id="{AAFDED37-D9B3-42DF-A79F-679BB7D8D822}"/>
+              </a:ext>
+            </a:extLst>
+          </p:cNvPr>
+          <p:cNvSpPr txBox="1">
+            <a:spLocks/>
+          </p:cNvSpPr>
+          <p:nvPr/>
+        </p:nvSpPr>
+        <p:spPr>
+          <a:xfrm>
+            <a:off x="477622" y="2653800"/>
+            <a:ext cx="3084844" cy="3975600"/>
+          </a:xfrm>
+          <a:prstGeom prst="rect">
+            <a:avLst/>
+          </a:prstGeom>
+        </p:spPr>
+        <p:txBody>
+          <a:bodyPr vert="horz" lIns="91440" tIns="45720" rIns="91440" bIns="45720" rtlCol="0" anchor="b">
+            <a:normAutofit fontScale="97500"/>
+          </a:bodyPr>
+          <a:lstStyle>
+            <a:lvl1pPr algn="l" defTabSz="914400" rtl="0" eaLnBrk="1" latinLnBrk="0" hangingPunct="1">
+              <a:lnSpc>
+                <a:spcPct val="85000"/>
+              </a:lnSpc>
+              <a:spcBef>
+                <a:spcPct val="0"/>
+              </a:spcBef>
+              <a:buNone/>
+              <a:defRPr sz="4800" kern="1200" spc="-50" baseline="0">
+                <a:solidFill>
+                  <a:schemeClr val="tx1">
+                    <a:lumMod val="75000"/>
+                    <a:lumOff val="25000"/>
+                  </a:schemeClr>
+                </a:solidFill>
+                <a:latin typeface="+mj-lt"/>
+                <a:ea typeface="+mj-ea"/>
+                <a:cs typeface="+mj-cs"/>
+              </a:defRPr>
+            </a:lvl1pPr>
+          </a:lstStyle>
+          <a:p>
+            <a:r>
+              <a:rPr lang="en-US" sz="3200" b="1" dirty="0">
+                <a:solidFill>
+                  <a:srgbClr val="FFFFFF"/>
+                </a:solidFill>
+              </a:rPr>
+              <a:t>Goal: </a:t>
+            </a:r>
+            <a:br>
+              <a:rPr lang="en-US" sz="3200" dirty="0">
+                <a:solidFill>
+                  <a:srgbClr val="FFFFFF"/>
+                </a:solidFill>
+              </a:rPr>
+            </a:br>
+            <a:r>
+              <a:rPr lang="en-US" sz="3200" dirty="0">
+                <a:solidFill>
+                  <a:srgbClr val="FFFFFF"/>
+                </a:solidFill>
+              </a:rPr>
+              <a:t>Be able to do everything within UiPath instead of having to use external SQL queries</a:t>
+            </a:r>
+          </a:p>
+          <a:p>
+            <a:endParaRPr lang="en-US" sz="3200" dirty="0">
+              <a:solidFill>
+                <a:srgbClr val="FFFFFF"/>
+              </a:solidFill>
+            </a:endParaRPr>
+          </a:p>
+          <a:p>
+            <a:endParaRPr lang="en-US" sz="3200" dirty="0">
+              <a:solidFill>
+                <a:srgbClr val="FFFFFF"/>
+              </a:solidFill>
+            </a:endParaRPr>
+          </a:p>
+        </p:txBody>
+      </p:sp>
     </p:spTree>
     <p:extLst>
       <p:ext uri="{BB962C8B-B14F-4D97-AF65-F5344CB8AC3E}">
@@ -7814,6 +8511,394 @@
 <file path=ppt/slides/slide6.xml><?xml version="1.0" encoding="utf-8"?>
 <p:sld xmlns:a="http://schemas.openxmlformats.org/drawingml/2006/main" xmlns:r="http://schemas.openxmlformats.org/officeDocument/2006/relationships" xmlns:p="http://schemas.openxmlformats.org/presentationml/2006/main">
   <p:cSld>
+    <p:bg>
+      <p:bgPr>
+        <a:solidFill>
+          <a:schemeClr val="bg1"/>
+        </a:solidFill>
+        <a:effectLst/>
+      </p:bgPr>
+    </p:bg>
+    <p:spTree>
+      <p:nvGrpSpPr>
+        <p:cNvPr id="1" name=""/>
+        <p:cNvGrpSpPr/>
+        <p:nvPr/>
+      </p:nvGrpSpPr>
+      <p:grpSpPr>
+        <a:xfrm>
+          <a:off x="0" y="0"/>
+          <a:ext cx="0" cy="0"/>
+          <a:chOff x="0" y="0"/>
+          <a:chExt cx="0" cy="0"/>
+        </a:xfrm>
+      </p:grpSpPr>
+      <p:sp useBgFill="1">
+        <p:nvSpPr>
+          <p:cNvPr id="8" name="Rectangle 7">
+            <a:extLst>
+              <a:ext uri="{FF2B5EF4-FFF2-40B4-BE49-F238E27FC236}">
+                <a16:creationId xmlns:a16="http://schemas.microsoft.com/office/drawing/2014/main" id="{3741B58E-3B65-4A01-A276-975AB2CF8A08}"/>
+              </a:ext>
+              <a:ext uri="{C183D7F6-B498-43B3-948B-1728B52AA6E4}">
+                <adec:decorative xmlns:adec="http://schemas.microsoft.com/office/drawing/2017/decorative" val="1"/>
+              </a:ext>
+            </a:extLst>
+          </p:cNvPr>
+          <p:cNvSpPr>
+            <a:spLocks noGrp="1" noRot="1" noChangeAspect="1" noMove="1" noResize="1" noEditPoints="1" noAdjustHandles="1" noChangeArrowheads="1" noChangeShapeType="1" noTextEdit="1"/>
+          </p:cNvSpPr>
+          <p:nvPr>
+            <p:extLst>
+              <p:ext uri="{386F3935-93C4-4BCD-93E2-E3B085C9AB24}">
+                <p16:designElem xmlns:p16="http://schemas.microsoft.com/office/powerpoint/2015/main" val="1"/>
+              </p:ext>
+            </p:extLst>
+          </p:nvPr>
+        </p:nvSpPr>
+        <p:spPr>
+          <a:xfrm>
+            <a:off x="0" y="0"/>
+            <a:ext cx="12186315" cy="6858000"/>
+          </a:xfrm>
+          <a:prstGeom prst="rect">
+            <a:avLst/>
+          </a:prstGeom>
+          <a:ln>
+            <a:noFill/>
+          </a:ln>
+        </p:spPr>
+        <p:style>
+          <a:lnRef idx="2">
+            <a:schemeClr val="accent6">
+              <a:shade val="50000"/>
+            </a:schemeClr>
+          </a:lnRef>
+          <a:fillRef idx="1001">
+            <a:schemeClr val="lt1"/>
+          </a:fillRef>
+          <a:effectRef idx="0">
+            <a:schemeClr val="accent6"/>
+          </a:effectRef>
+          <a:fontRef idx="minor">
+            <a:schemeClr val="lt1"/>
+          </a:fontRef>
+        </p:style>
+        <p:txBody>
+          <a:bodyPr rtlCol="0" anchor="ctr"/>
+          <a:lstStyle/>
+          <a:p>
+            <a:pPr algn="ctr"/>
+            <a:endParaRPr lang="en-US"/>
+          </a:p>
+        </p:txBody>
+      </p:sp>
+      <p:sp>
+        <p:nvSpPr>
+          <p:cNvPr id="10" name="Rectangle 9">
+            <a:extLst>
+              <a:ext uri="{FF2B5EF4-FFF2-40B4-BE49-F238E27FC236}">
+                <a16:creationId xmlns:a16="http://schemas.microsoft.com/office/drawing/2014/main" id="{7AAC67C3-831B-4AB1-A259-DFB839CAFAFC}"/>
+              </a:ext>
+              <a:ext uri="{C183D7F6-B498-43B3-948B-1728B52AA6E4}">
+                <adec:decorative xmlns:adec="http://schemas.microsoft.com/office/drawing/2017/decorative" val="1"/>
+              </a:ext>
+            </a:extLst>
+          </p:cNvPr>
+          <p:cNvSpPr>
+            <a:spLocks noGrp="1" noRot="1" noChangeAspect="1" noMove="1" noResize="1" noEditPoints="1" noAdjustHandles="1" noChangeArrowheads="1" noChangeShapeType="1" noTextEdit="1"/>
+          </p:cNvSpPr>
+          <p:nvPr>
+            <p:extLst>
+              <p:ext uri="{386F3935-93C4-4BCD-93E2-E3B085C9AB24}">
+                <p16:designElem xmlns:p16="http://schemas.microsoft.com/office/powerpoint/2015/main" val="1"/>
+              </p:ext>
+            </p:extLst>
+          </p:nvPr>
+        </p:nvSpPr>
+        <p:spPr>
+          <a:xfrm>
+            <a:off x="16" y="0"/>
+            <a:ext cx="4050791" cy="6858000"/>
+          </a:xfrm>
+          <a:prstGeom prst="rect">
+            <a:avLst/>
+          </a:prstGeom>
+          <a:solidFill>
+            <a:schemeClr val="accent2"/>
+          </a:solidFill>
+          <a:ln>
+            <a:noFill/>
+          </a:ln>
+        </p:spPr>
+        <p:style>
+          <a:lnRef idx="2">
+            <a:schemeClr val="accent1">
+              <a:shade val="50000"/>
+            </a:schemeClr>
+          </a:lnRef>
+          <a:fillRef idx="1">
+            <a:schemeClr val="accent1"/>
+          </a:fillRef>
+          <a:effectRef idx="0">
+            <a:schemeClr val="accent1"/>
+          </a:effectRef>
+          <a:fontRef idx="minor">
+            <a:schemeClr val="lt1"/>
+          </a:fontRef>
+        </p:style>
+      </p:sp>
+      <p:sp>
+        <p:nvSpPr>
+          <p:cNvPr id="12" name="Rectangle 11">
+            <a:extLst>
+              <a:ext uri="{FF2B5EF4-FFF2-40B4-BE49-F238E27FC236}">
+                <a16:creationId xmlns:a16="http://schemas.microsoft.com/office/drawing/2014/main" id="{054B3F04-9EAC-45C0-B3CE-0387EEA10A0C}"/>
+              </a:ext>
+              <a:ext uri="{C183D7F6-B498-43B3-948B-1728B52AA6E4}">
+                <adec:decorative xmlns:adec="http://schemas.microsoft.com/office/drawing/2017/decorative" val="1"/>
+              </a:ext>
+            </a:extLst>
+          </p:cNvPr>
+          <p:cNvSpPr>
+            <a:spLocks noGrp="1" noRot="1" noChangeAspect="1" noMove="1" noResize="1" noEditPoints="1" noAdjustHandles="1" noChangeArrowheads="1" noChangeShapeType="1" noTextEdit="1"/>
+          </p:cNvSpPr>
+          <p:nvPr>
+            <p:extLst>
+              <p:ext uri="{386F3935-93C4-4BCD-93E2-E3B085C9AB24}">
+                <p16:designElem xmlns:p16="http://schemas.microsoft.com/office/powerpoint/2015/main" val="1"/>
+              </p:ext>
+            </p:extLst>
+          </p:nvPr>
+        </p:nvSpPr>
+        <p:spPr>
+          <a:xfrm>
+            <a:off x="4040071" y="0"/>
+            <a:ext cx="64008" cy="6858000"/>
+          </a:xfrm>
+          <a:prstGeom prst="rect">
+            <a:avLst/>
+          </a:prstGeom>
+          <a:solidFill>
+            <a:schemeClr val="accent1"/>
+          </a:solidFill>
+          <a:ln>
+            <a:noFill/>
+          </a:ln>
+        </p:spPr>
+        <p:style>
+          <a:lnRef idx="2">
+            <a:schemeClr val="accent1">
+              <a:shade val="50000"/>
+            </a:schemeClr>
+          </a:lnRef>
+          <a:fillRef idx="1">
+            <a:schemeClr val="accent1"/>
+          </a:fillRef>
+          <a:effectRef idx="0">
+            <a:schemeClr val="accent1"/>
+          </a:effectRef>
+          <a:fontRef idx="minor">
+            <a:schemeClr val="lt1"/>
+          </a:fontRef>
+        </p:style>
+      </p:sp>
+      <p:pic>
+        <p:nvPicPr>
+          <p:cNvPr id="5" name="Content Placeholder 4">
+            <a:extLst>
+              <a:ext uri="{FF2B5EF4-FFF2-40B4-BE49-F238E27FC236}">
+                <a16:creationId xmlns:a16="http://schemas.microsoft.com/office/drawing/2014/main" id="{A29EF850-96DD-4C47-B4E3-DC13D8D23FB2}"/>
+              </a:ext>
+            </a:extLst>
+          </p:cNvPr>
+          <p:cNvPicPr>
+            <a:picLocks noGrp="1" noChangeAspect="1"/>
+          </p:cNvPicPr>
+          <p:nvPr>
+            <p:ph idx="1"/>
+          </p:nvPr>
+        </p:nvPicPr>
+        <p:blipFill>
+          <a:blip r:embed="rId2"/>
+          <a:stretch>
+            <a:fillRect/>
+          </a:stretch>
+        </p:blipFill>
+        <p:spPr>
+          <a:xfrm>
+            <a:off x="4243939" y="307864"/>
+            <a:ext cx="7633101" cy="6390722"/>
+          </a:xfrm>
+        </p:spPr>
+      </p:pic>
+      <p:sp>
+        <p:nvSpPr>
+          <p:cNvPr id="9" name="Title 1">
+            <a:extLst>
+              <a:ext uri="{FF2B5EF4-FFF2-40B4-BE49-F238E27FC236}">
+                <a16:creationId xmlns:a16="http://schemas.microsoft.com/office/drawing/2014/main" id="{F3599635-B4E6-4532-B2C8-DC1FBAA5129E}"/>
+              </a:ext>
+            </a:extLst>
+          </p:cNvPr>
+          <p:cNvSpPr>
+            <a:spLocks noGrp="1"/>
+          </p:cNvSpPr>
+          <p:nvPr>
+            <p:ph type="title"/>
+          </p:nvPr>
+        </p:nvSpPr>
+        <p:spPr>
+          <a:xfrm>
+            <a:off x="492371" y="104944"/>
+            <a:ext cx="3494428" cy="2103875"/>
+          </a:xfrm>
+        </p:spPr>
+        <p:txBody>
+          <a:bodyPr>
+            <a:normAutofit/>
+          </a:bodyPr>
+          <a:lstStyle/>
+          <a:p>
+            <a:r>
+              <a:rPr lang="en-US" sz="4400" dirty="0">
+                <a:solidFill>
+                  <a:srgbClr val="FFFFFF"/>
+                </a:solidFill>
+              </a:rPr>
+              <a:t>Three vendors</a:t>
+            </a:r>
+            <a:br>
+              <a:rPr lang="en-US" sz="4400" dirty="0">
+                <a:solidFill>
+                  <a:srgbClr val="FFFFFF"/>
+                </a:solidFill>
+              </a:rPr>
+            </a:br>
+            <a:br>
+              <a:rPr lang="en-US" sz="4400" dirty="0">
+                <a:solidFill>
+                  <a:srgbClr val="FFFFFF"/>
+                </a:solidFill>
+              </a:rPr>
+            </a:br>
+            <a:endParaRPr lang="en-US" sz="4400" dirty="0">
+              <a:solidFill>
+                <a:srgbClr val="FFFFFF"/>
+              </a:solidFill>
+            </a:endParaRPr>
+          </a:p>
+        </p:txBody>
+      </p:sp>
+      <p:sp>
+        <p:nvSpPr>
+          <p:cNvPr id="13" name="Title 1">
+            <a:extLst>
+              <a:ext uri="{FF2B5EF4-FFF2-40B4-BE49-F238E27FC236}">
+                <a16:creationId xmlns:a16="http://schemas.microsoft.com/office/drawing/2014/main" id="{E3B7F96D-ED44-43DF-8408-09F40283FE9A}"/>
+              </a:ext>
+            </a:extLst>
+          </p:cNvPr>
+          <p:cNvSpPr txBox="1">
+            <a:spLocks/>
+          </p:cNvSpPr>
+          <p:nvPr/>
+        </p:nvSpPr>
+        <p:spPr>
+          <a:xfrm>
+            <a:off x="562301" y="389713"/>
+            <a:ext cx="3494428" cy="2103875"/>
+          </a:xfrm>
+          <a:prstGeom prst="rect">
+            <a:avLst/>
+          </a:prstGeom>
+        </p:spPr>
+        <p:txBody>
+          <a:bodyPr vert="horz" lIns="91440" tIns="45720" rIns="91440" bIns="45720" rtlCol="0" anchor="b">
+            <a:normAutofit/>
+          </a:bodyPr>
+          <a:lstStyle>
+            <a:lvl1pPr algn="l" defTabSz="914400" rtl="0" eaLnBrk="1" latinLnBrk="0" hangingPunct="1">
+              <a:lnSpc>
+                <a:spcPct val="85000"/>
+              </a:lnSpc>
+              <a:spcBef>
+                <a:spcPct val="0"/>
+              </a:spcBef>
+              <a:buNone/>
+              <a:defRPr sz="4800" kern="1200" spc="-50" baseline="0">
+                <a:solidFill>
+                  <a:schemeClr val="tx1">
+                    <a:lumMod val="75000"/>
+                    <a:lumOff val="25000"/>
+                  </a:schemeClr>
+                </a:solidFill>
+                <a:latin typeface="+mj-lt"/>
+                <a:ea typeface="+mj-ea"/>
+                <a:cs typeface="+mj-cs"/>
+              </a:defRPr>
+            </a:lvl1pPr>
+          </a:lstStyle>
+          <a:p>
+            <a:pPr marL="571500" indent="-571500">
+              <a:buFontTx/>
+              <a:buChar char="-"/>
+            </a:pPr>
+            <a:r>
+              <a:rPr lang="en-US" sz="3600" dirty="0">
+                <a:solidFill>
+                  <a:srgbClr val="FFFFFF"/>
+                </a:solidFill>
+              </a:rPr>
+              <a:t>Stationery</a:t>
+            </a:r>
+          </a:p>
+          <a:p>
+            <a:pPr marL="571500" indent="-571500">
+              <a:buFontTx/>
+              <a:buChar char="-"/>
+            </a:pPr>
+            <a:r>
+              <a:rPr lang="en-US" sz="3600" dirty="0">
+                <a:solidFill>
+                  <a:srgbClr val="FFFFFF"/>
+                </a:solidFill>
+              </a:rPr>
+              <a:t>Food</a:t>
+            </a:r>
+          </a:p>
+          <a:p>
+            <a:pPr marL="571500" indent="-571500">
+              <a:buFontTx/>
+              <a:buChar char="-"/>
+            </a:pPr>
+            <a:r>
+              <a:rPr lang="en-US" sz="3600" dirty="0">
+                <a:solidFill>
+                  <a:srgbClr val="FFFFFF"/>
+                </a:solidFill>
+              </a:rPr>
+              <a:t>Beverages</a:t>
+            </a:r>
+          </a:p>
+        </p:txBody>
+      </p:sp>
+    </p:spTree>
+    <p:extLst>
+      <p:ext uri="{BB962C8B-B14F-4D97-AF65-F5344CB8AC3E}">
+        <p14:creationId xmlns:p14="http://schemas.microsoft.com/office/powerpoint/2010/main" val="613049354"/>
+      </p:ext>
+    </p:extLst>
+  </p:cSld>
+  <p:clrMapOvr>
+    <a:masterClrMapping/>
+  </p:clrMapOvr>
+</p:sld>
+</file>
+
+<file path=ppt/slides/slide7.xml><?xml version="1.0" encoding="utf-8"?>
+<p:sld xmlns:a="http://schemas.openxmlformats.org/drawingml/2006/main" xmlns:r="http://schemas.openxmlformats.org/officeDocument/2006/relationships" xmlns:p="http://schemas.openxmlformats.org/presentationml/2006/main">
+  <p:cSld>
     <p:spTree>
       <p:nvGrpSpPr>
         <p:cNvPr id="1" name=""/>
@@ -8836,7 +9921,7 @@
 </p:sld>
 </file>
 
-<file path=ppt/slides/slide7.xml><?xml version="1.0" encoding="utf-8"?>
+<file path=ppt/slides/slide8.xml><?xml version="1.0" encoding="utf-8"?>
 <p:sld xmlns:a="http://schemas.openxmlformats.org/drawingml/2006/main" xmlns:r="http://schemas.openxmlformats.org/officeDocument/2006/relationships" xmlns:p="http://schemas.openxmlformats.org/presentationml/2006/main">
   <p:cSld>
     <p:spTree>
@@ -9240,7 +10325,7 @@
 </p:sld>
 </file>
 
-<file path=ppt/slides/slide8.xml><?xml version="1.0" encoding="utf-8"?>
+<file path=ppt/slides/slide9.xml><?xml version="1.0" encoding="utf-8"?>
 <p:sld xmlns:a="http://schemas.openxmlformats.org/drawingml/2006/main" xmlns:r="http://schemas.openxmlformats.org/officeDocument/2006/relationships" xmlns:p="http://schemas.openxmlformats.org/presentationml/2006/main">
   <p:cSld>
     <p:spTree>
@@ -9653,597 +10738,6 @@
     <p:extLst>
       <p:ext uri="{BB962C8B-B14F-4D97-AF65-F5344CB8AC3E}">
         <p14:creationId xmlns:p14="http://schemas.microsoft.com/office/powerpoint/2010/main" val="2552852390"/>
-      </p:ext>
-    </p:extLst>
-  </p:cSld>
-  <p:clrMapOvr>
-    <a:masterClrMapping/>
-  </p:clrMapOvr>
-</p:sld>
-</file>
-
-<file path=ppt/slides/slide9.xml><?xml version="1.0" encoding="utf-8"?>
-<p:sld xmlns:a="http://schemas.openxmlformats.org/drawingml/2006/main" xmlns:r="http://schemas.openxmlformats.org/officeDocument/2006/relationships" xmlns:p="http://schemas.openxmlformats.org/presentationml/2006/main">
-  <p:cSld>
-    <p:bg>
-      <p:bgPr>
-        <a:solidFill>
-          <a:schemeClr val="bg1"/>
-        </a:solidFill>
-        <a:effectLst/>
-      </p:bgPr>
-    </p:bg>
-    <p:spTree>
-      <p:nvGrpSpPr>
-        <p:cNvPr id="1" name=""/>
-        <p:cNvGrpSpPr/>
-        <p:nvPr/>
-      </p:nvGrpSpPr>
-      <p:grpSpPr>
-        <a:xfrm>
-          <a:off x="0" y="0"/>
-          <a:ext cx="0" cy="0"/>
-          <a:chOff x="0" y="0"/>
-          <a:chExt cx="0" cy="0"/>
-        </a:xfrm>
-      </p:grpSpPr>
-      <p:sp useBgFill="1">
-        <p:nvSpPr>
-          <p:cNvPr id="8" name="Rectangle 7">
-            <a:extLst>
-              <a:ext uri="{FF2B5EF4-FFF2-40B4-BE49-F238E27FC236}">
-                <a16:creationId xmlns:a16="http://schemas.microsoft.com/office/drawing/2014/main" id="{3741B58E-3B65-4A01-A276-975AB2CF8A08}"/>
-              </a:ext>
-              <a:ext uri="{C183D7F6-B498-43B3-948B-1728B52AA6E4}">
-                <adec:decorative xmlns:adec="http://schemas.microsoft.com/office/drawing/2017/decorative" val="1"/>
-              </a:ext>
-            </a:extLst>
-          </p:cNvPr>
-          <p:cNvSpPr>
-            <a:spLocks noGrp="1" noRot="1" noChangeAspect="1" noMove="1" noResize="1" noEditPoints="1" noAdjustHandles="1" noChangeArrowheads="1" noChangeShapeType="1" noTextEdit="1"/>
-          </p:cNvSpPr>
-          <p:nvPr>
-            <p:extLst>
-              <p:ext uri="{386F3935-93C4-4BCD-93E2-E3B085C9AB24}">
-                <p16:designElem xmlns:p16="http://schemas.microsoft.com/office/powerpoint/2015/main" val="1"/>
-              </p:ext>
-            </p:extLst>
-          </p:nvPr>
-        </p:nvSpPr>
-        <p:spPr>
-          <a:xfrm>
-            <a:off x="0" y="0"/>
-            <a:ext cx="12186315" cy="6858000"/>
-          </a:xfrm>
-          <a:prstGeom prst="rect">
-            <a:avLst/>
-          </a:prstGeom>
-          <a:ln>
-            <a:noFill/>
-          </a:ln>
-        </p:spPr>
-        <p:style>
-          <a:lnRef idx="2">
-            <a:schemeClr val="accent6">
-              <a:shade val="50000"/>
-            </a:schemeClr>
-          </a:lnRef>
-          <a:fillRef idx="1001">
-            <a:schemeClr val="lt1"/>
-          </a:fillRef>
-          <a:effectRef idx="0">
-            <a:schemeClr val="accent6"/>
-          </a:effectRef>
-          <a:fontRef idx="minor">
-            <a:schemeClr val="lt1"/>
-          </a:fontRef>
-        </p:style>
-        <p:txBody>
-          <a:bodyPr rtlCol="0" anchor="ctr"/>
-          <a:lstStyle/>
-          <a:p>
-            <a:pPr algn="ctr"/>
-            <a:endParaRPr lang="en-US"/>
-          </a:p>
-        </p:txBody>
-      </p:sp>
-      <p:sp>
-        <p:nvSpPr>
-          <p:cNvPr id="10" name="Rectangle 9">
-            <a:extLst>
-              <a:ext uri="{FF2B5EF4-FFF2-40B4-BE49-F238E27FC236}">
-                <a16:creationId xmlns:a16="http://schemas.microsoft.com/office/drawing/2014/main" id="{7AAC67C3-831B-4AB1-A259-DFB839CAFAFC}"/>
-              </a:ext>
-              <a:ext uri="{C183D7F6-B498-43B3-948B-1728B52AA6E4}">
-                <adec:decorative xmlns:adec="http://schemas.microsoft.com/office/drawing/2017/decorative" val="1"/>
-              </a:ext>
-            </a:extLst>
-          </p:cNvPr>
-          <p:cNvSpPr>
-            <a:spLocks noGrp="1" noRot="1" noChangeAspect="1" noMove="1" noResize="1" noEditPoints="1" noAdjustHandles="1" noChangeArrowheads="1" noChangeShapeType="1" noTextEdit="1"/>
-          </p:cNvSpPr>
-          <p:nvPr>
-            <p:extLst>
-              <p:ext uri="{386F3935-93C4-4BCD-93E2-E3B085C9AB24}">
-                <p16:designElem xmlns:p16="http://schemas.microsoft.com/office/powerpoint/2015/main" val="1"/>
-              </p:ext>
-            </p:extLst>
-          </p:nvPr>
-        </p:nvSpPr>
-        <p:spPr>
-          <a:xfrm>
-            <a:off x="16" y="0"/>
-            <a:ext cx="4050791" cy="6858000"/>
-          </a:xfrm>
-          <a:prstGeom prst="rect">
-            <a:avLst/>
-          </a:prstGeom>
-          <a:solidFill>
-            <a:schemeClr val="accent2"/>
-          </a:solidFill>
-          <a:ln>
-            <a:noFill/>
-          </a:ln>
-        </p:spPr>
-        <p:style>
-          <a:lnRef idx="2">
-            <a:schemeClr val="accent1">
-              <a:shade val="50000"/>
-            </a:schemeClr>
-          </a:lnRef>
-          <a:fillRef idx="1">
-            <a:schemeClr val="accent1"/>
-          </a:fillRef>
-          <a:effectRef idx="0">
-            <a:schemeClr val="accent1"/>
-          </a:effectRef>
-          <a:fontRef idx="minor">
-            <a:schemeClr val="lt1"/>
-          </a:fontRef>
-        </p:style>
-      </p:sp>
-      <p:sp>
-        <p:nvSpPr>
-          <p:cNvPr id="12" name="Rectangle 11">
-            <a:extLst>
-              <a:ext uri="{FF2B5EF4-FFF2-40B4-BE49-F238E27FC236}">
-                <a16:creationId xmlns:a16="http://schemas.microsoft.com/office/drawing/2014/main" id="{054B3F04-9EAC-45C0-B3CE-0387EEA10A0C}"/>
-              </a:ext>
-              <a:ext uri="{C183D7F6-B498-43B3-948B-1728B52AA6E4}">
-                <adec:decorative xmlns:adec="http://schemas.microsoft.com/office/drawing/2017/decorative" val="1"/>
-              </a:ext>
-            </a:extLst>
-          </p:cNvPr>
-          <p:cNvSpPr>
-            <a:spLocks noGrp="1" noRot="1" noChangeAspect="1" noMove="1" noResize="1" noEditPoints="1" noAdjustHandles="1" noChangeArrowheads="1" noChangeShapeType="1" noTextEdit="1"/>
-          </p:cNvSpPr>
-          <p:nvPr>
-            <p:extLst>
-              <p:ext uri="{386F3935-93C4-4BCD-93E2-E3B085C9AB24}">
-                <p16:designElem xmlns:p16="http://schemas.microsoft.com/office/powerpoint/2015/main" val="1"/>
-              </p:ext>
-            </p:extLst>
-          </p:nvPr>
-        </p:nvSpPr>
-        <p:spPr>
-          <a:xfrm>
-            <a:off x="4040071" y="0"/>
-            <a:ext cx="64008" cy="6858000"/>
-          </a:xfrm>
-          <a:prstGeom prst="rect">
-            <a:avLst/>
-          </a:prstGeom>
-          <a:solidFill>
-            <a:schemeClr val="accent1"/>
-          </a:solidFill>
-          <a:ln>
-            <a:noFill/>
-          </a:ln>
-        </p:spPr>
-        <p:style>
-          <a:lnRef idx="2">
-            <a:schemeClr val="accent1">
-              <a:shade val="50000"/>
-            </a:schemeClr>
-          </a:lnRef>
-          <a:fillRef idx="1">
-            <a:schemeClr val="accent1"/>
-          </a:fillRef>
-          <a:effectRef idx="0">
-            <a:schemeClr val="accent1"/>
-          </a:effectRef>
-          <a:fontRef idx="minor">
-            <a:schemeClr val="lt1"/>
-          </a:fontRef>
-        </p:style>
-      </p:sp>
-      <p:sp>
-        <p:nvSpPr>
-          <p:cNvPr id="9" name="Title 1">
-            <a:extLst>
-              <a:ext uri="{FF2B5EF4-FFF2-40B4-BE49-F238E27FC236}">
-                <a16:creationId xmlns:a16="http://schemas.microsoft.com/office/drawing/2014/main" id="{CCB9A958-AEDA-470C-AB64-69CBC762D266}"/>
-              </a:ext>
-            </a:extLst>
-          </p:cNvPr>
-          <p:cNvSpPr>
-            <a:spLocks noGrp="1"/>
-          </p:cNvSpPr>
-          <p:nvPr>
-            <p:ph type="title"/>
-          </p:nvPr>
-        </p:nvSpPr>
-        <p:spPr>
-          <a:xfrm>
-            <a:off x="492371" y="104944"/>
-            <a:ext cx="3494428" cy="2103875"/>
-          </a:xfrm>
-        </p:spPr>
-        <p:txBody>
-          <a:bodyPr>
-            <a:normAutofit/>
-          </a:bodyPr>
-          <a:lstStyle/>
-          <a:p>
-            <a:r>
-              <a:rPr lang="en-US" sz="4400" dirty="0">
-                <a:solidFill>
-                  <a:srgbClr val="FFFFFF"/>
-                </a:solidFill>
-              </a:rPr>
-              <a:t>Feature: </a:t>
-            </a:r>
-            <a:br>
-              <a:rPr lang="en-US" sz="4400" dirty="0">
-                <a:solidFill>
-                  <a:srgbClr val="FFFFFF"/>
-                </a:solidFill>
-              </a:rPr>
-            </a:br>
-            <a:r>
-              <a:rPr lang="en-US" sz="4400" dirty="0">
-                <a:solidFill>
-                  <a:srgbClr val="FFFFFF"/>
-                </a:solidFill>
-              </a:rPr>
-              <a:t>View Subtotals</a:t>
-            </a:r>
-          </a:p>
-        </p:txBody>
-      </p:sp>
-      <p:sp>
-        <p:nvSpPr>
-          <p:cNvPr id="14" name="TextBox 13">
-            <a:extLst>
-              <a:ext uri="{FF2B5EF4-FFF2-40B4-BE49-F238E27FC236}">
-                <a16:creationId xmlns:a16="http://schemas.microsoft.com/office/drawing/2014/main" id="{70159E9E-BB50-49C4-B976-0F3D58B93E30}"/>
-              </a:ext>
-            </a:extLst>
-          </p:cNvPr>
-          <p:cNvSpPr txBox="1"/>
-          <p:nvPr/>
-        </p:nvSpPr>
-        <p:spPr>
-          <a:xfrm>
-            <a:off x="6093157" y="50198"/>
-            <a:ext cx="1698530" cy="954107"/>
-          </a:xfrm>
-          <a:prstGeom prst="rect">
-            <a:avLst/>
-          </a:prstGeom>
-          <a:noFill/>
-        </p:spPr>
-        <p:txBody>
-          <a:bodyPr wrap="square" rtlCol="0">
-            <a:spAutoFit/>
-          </a:bodyPr>
-          <a:lstStyle/>
-          <a:p>
-            <a:r>
-              <a:rPr lang="en-US" sz="2800" dirty="0"/>
-              <a:t>SQL</a:t>
-            </a:r>
-          </a:p>
-          <a:p>
-            <a:endParaRPr lang="en-US" sz="2800" dirty="0"/>
-          </a:p>
-        </p:txBody>
-      </p:sp>
-      <p:sp>
-        <p:nvSpPr>
-          <p:cNvPr id="16" name="TextBox 15">
-            <a:extLst>
-              <a:ext uri="{FF2B5EF4-FFF2-40B4-BE49-F238E27FC236}">
-                <a16:creationId xmlns:a16="http://schemas.microsoft.com/office/drawing/2014/main" id="{96CE5BCA-33D8-4189-9E0F-FDAF3C7358AB}"/>
-              </a:ext>
-            </a:extLst>
-          </p:cNvPr>
-          <p:cNvSpPr txBox="1"/>
-          <p:nvPr/>
-        </p:nvSpPr>
-        <p:spPr>
-          <a:xfrm>
-            <a:off x="6064072" y="3308129"/>
-            <a:ext cx="2298255" cy="523220"/>
-          </a:xfrm>
-          <a:prstGeom prst="rect">
-            <a:avLst/>
-          </a:prstGeom>
-          <a:noFill/>
-        </p:spPr>
-        <p:txBody>
-          <a:bodyPr wrap="square" rtlCol="0">
-            <a:spAutoFit/>
-          </a:bodyPr>
-          <a:lstStyle/>
-          <a:p>
-            <a:r>
-              <a:rPr lang="en-US" sz="2800" dirty="0"/>
-              <a:t>UiPath Output</a:t>
-            </a:r>
-          </a:p>
-        </p:txBody>
-      </p:sp>
-      <p:cxnSp>
-        <p:nvCxnSpPr>
-          <p:cNvPr id="3" name="Straight Arrow Connector 2">
-            <a:extLst>
-              <a:ext uri="{FF2B5EF4-FFF2-40B4-BE49-F238E27FC236}">
-                <a16:creationId xmlns:a16="http://schemas.microsoft.com/office/drawing/2014/main" id="{E3769150-044B-4E69-9F0B-233BF8BFA682}"/>
-              </a:ext>
-            </a:extLst>
-          </p:cNvPr>
-          <p:cNvCxnSpPr/>
-          <p:nvPr/>
-        </p:nvCxnSpPr>
-        <p:spPr>
-          <a:xfrm>
-            <a:off x="4566130" y="3523906"/>
-            <a:ext cx="1295400" cy="0"/>
-          </a:xfrm>
-          <a:prstGeom prst="straightConnector1">
-            <a:avLst/>
-          </a:prstGeom>
-          <a:ln w="57150">
-            <a:solidFill>
-              <a:srgbClr val="FF0000"/>
-            </a:solidFill>
-            <a:tailEnd type="triangle"/>
-          </a:ln>
-        </p:spPr>
-        <p:style>
-          <a:lnRef idx="1">
-            <a:schemeClr val="dk1"/>
-          </a:lnRef>
-          <a:fillRef idx="0">
-            <a:schemeClr val="dk1"/>
-          </a:fillRef>
-          <a:effectRef idx="0">
-            <a:schemeClr val="dk1"/>
-          </a:effectRef>
-          <a:fontRef idx="minor">
-            <a:schemeClr val="tx1"/>
-          </a:fontRef>
-        </p:style>
-      </p:cxnSp>
-      <p:sp>
-        <p:nvSpPr>
-          <p:cNvPr id="13" name="TextBox 12">
-            <a:extLst>
-              <a:ext uri="{FF2B5EF4-FFF2-40B4-BE49-F238E27FC236}">
-                <a16:creationId xmlns:a16="http://schemas.microsoft.com/office/drawing/2014/main" id="{3CDDD439-3FC7-4D2D-8AF4-9BD220B88AA6}"/>
-              </a:ext>
-            </a:extLst>
-          </p:cNvPr>
-          <p:cNvSpPr txBox="1"/>
-          <p:nvPr/>
-        </p:nvSpPr>
-        <p:spPr>
-          <a:xfrm>
-            <a:off x="6093157" y="566678"/>
-            <a:ext cx="5606472" cy="2862322"/>
-          </a:xfrm>
-          <a:prstGeom prst="rect">
-            <a:avLst/>
-          </a:prstGeom>
-          <a:noFill/>
-          <a:ln>
-            <a:solidFill>
-              <a:schemeClr val="tx1"/>
-            </a:solidFill>
-          </a:ln>
-        </p:spPr>
-        <p:txBody>
-          <a:bodyPr wrap="square" rtlCol="0">
-            <a:spAutoFit/>
-          </a:bodyPr>
-          <a:lstStyle/>
-          <a:p>
-            <a:r>
-              <a:rPr lang="en-US" dirty="0"/>
-              <a:t>"select </a:t>
-            </a:r>
-            <a:r>
-              <a:rPr lang="en-US" dirty="0" err="1"/>
-              <a:t>orders.ordernumber,clients.clientname</a:t>
-            </a:r>
-            <a:r>
-              <a:rPr lang="en-US" dirty="0"/>
-              <a:t>, shoppinglist.clientorder,shoppingexpense.price,shoppinglist.clientquantity,shoppingexpense.subtotal</a:t>
-            </a:r>
-          </a:p>
-          <a:p>
-            <a:r>
-              <a:rPr lang="en-US" dirty="0"/>
-              <a:t>from orders</a:t>
-            </a:r>
-          </a:p>
-          <a:p>
-            <a:r>
-              <a:rPr lang="en-US" dirty="0"/>
-              <a:t>inner join clients on </a:t>
-            </a:r>
-            <a:r>
-              <a:rPr lang="en-US" dirty="0" err="1"/>
-              <a:t>orders.clientid</a:t>
-            </a:r>
-            <a:r>
-              <a:rPr lang="en-US" dirty="0"/>
-              <a:t> = </a:t>
-            </a:r>
-            <a:r>
-              <a:rPr lang="en-US" dirty="0" err="1"/>
-              <a:t>clients.clientid</a:t>
-            </a:r>
-            <a:endParaRPr lang="en-US" dirty="0"/>
-          </a:p>
-          <a:p>
-            <a:r>
-              <a:rPr lang="en-US" dirty="0"/>
-              <a:t>inner join </a:t>
-            </a:r>
-            <a:r>
-              <a:rPr lang="en-US" dirty="0" err="1"/>
-              <a:t>shoppingexpense</a:t>
-            </a:r>
-            <a:r>
-              <a:rPr lang="en-US" dirty="0"/>
-              <a:t> on </a:t>
-            </a:r>
-            <a:r>
-              <a:rPr lang="en-US" dirty="0" err="1"/>
-              <a:t>shoppingexpense.ordernumber</a:t>
-            </a:r>
-            <a:r>
-              <a:rPr lang="en-US" dirty="0"/>
-              <a:t> = </a:t>
-            </a:r>
-            <a:r>
-              <a:rPr lang="en-US" dirty="0" err="1"/>
-              <a:t>orders.ordernumber</a:t>
-            </a:r>
-            <a:endParaRPr lang="en-US" dirty="0"/>
-          </a:p>
-          <a:p>
-            <a:r>
-              <a:rPr lang="en-US" dirty="0"/>
-              <a:t>inner join </a:t>
-            </a:r>
-            <a:r>
-              <a:rPr lang="en-US" dirty="0" err="1"/>
-              <a:t>shoppinglist</a:t>
-            </a:r>
-            <a:r>
-              <a:rPr lang="en-US" dirty="0"/>
-              <a:t> on </a:t>
-            </a:r>
-            <a:r>
-              <a:rPr lang="en-US" dirty="0" err="1"/>
-              <a:t>shoppinglist.itemID</a:t>
-            </a:r>
-            <a:r>
-              <a:rPr lang="en-US" dirty="0"/>
-              <a:t> = </a:t>
-            </a:r>
-            <a:r>
-              <a:rPr lang="en-US" dirty="0" err="1"/>
-              <a:t>shoppingexpense.itemID</a:t>
-            </a:r>
-            <a:endParaRPr lang="en-US" dirty="0"/>
-          </a:p>
-          <a:p>
-            <a:r>
-              <a:rPr lang="en-US" dirty="0"/>
-              <a:t>order by </a:t>
-            </a:r>
-            <a:r>
-              <a:rPr lang="en-US" dirty="0" err="1"/>
-              <a:t>ordernumber</a:t>
-            </a:r>
-            <a:r>
-              <a:rPr lang="en-US" dirty="0"/>
-              <a:t> </a:t>
-            </a:r>
-            <a:r>
-              <a:rPr lang="en-US" dirty="0" err="1"/>
-              <a:t>asc</a:t>
-            </a:r>
-            <a:r>
-              <a:rPr lang="en-US" dirty="0"/>
-              <a:t>;"</a:t>
-            </a:r>
-          </a:p>
-        </p:txBody>
-      </p:sp>
-      <p:pic>
-        <p:nvPicPr>
-          <p:cNvPr id="18" name="Picture 17">
-            <a:extLst>
-              <a:ext uri="{FF2B5EF4-FFF2-40B4-BE49-F238E27FC236}">
-                <a16:creationId xmlns:a16="http://schemas.microsoft.com/office/drawing/2014/main" id="{581EE854-8AA8-4DD7-B0BD-16B90DCEDF45}"/>
-              </a:ext>
-            </a:extLst>
-          </p:cNvPr>
-          <p:cNvPicPr>
-            <a:picLocks noChangeAspect="1"/>
-          </p:cNvPicPr>
-          <p:nvPr/>
-        </p:nvPicPr>
-        <p:blipFill>
-          <a:blip r:embed="rId2"/>
-          <a:stretch>
-            <a:fillRect/>
-          </a:stretch>
-        </p:blipFill>
-        <p:spPr>
-          <a:xfrm>
-            <a:off x="6093157" y="3945480"/>
-            <a:ext cx="5857599" cy="2074320"/>
-          </a:xfrm>
-          <a:prstGeom prst="rect">
-            <a:avLst/>
-          </a:prstGeom>
-          <a:ln>
-            <a:solidFill>
-              <a:schemeClr val="tx1"/>
-            </a:solidFill>
-          </a:ln>
-        </p:spPr>
-      </p:pic>
-      <p:pic>
-        <p:nvPicPr>
-          <p:cNvPr id="20" name="Picture 19">
-            <a:extLst>
-              <a:ext uri="{FF2B5EF4-FFF2-40B4-BE49-F238E27FC236}">
-                <a16:creationId xmlns:a16="http://schemas.microsoft.com/office/drawing/2014/main" id="{F08DDB26-7F71-425C-8FFF-639F9EF1BBBF}"/>
-              </a:ext>
-            </a:extLst>
-          </p:cNvPr>
-          <p:cNvPicPr>
-            <a:picLocks noChangeAspect="1"/>
-          </p:cNvPicPr>
-          <p:nvPr/>
-        </p:nvPicPr>
-        <p:blipFill>
-          <a:blip r:embed="rId3"/>
-          <a:stretch>
-            <a:fillRect/>
-          </a:stretch>
-        </p:blipFill>
-        <p:spPr>
-          <a:xfrm>
-            <a:off x="10432" y="2320068"/>
-            <a:ext cx="4363588" cy="4543265"/>
-          </a:xfrm>
-          <a:prstGeom prst="rect">
-            <a:avLst/>
-          </a:prstGeom>
-        </p:spPr>
-      </p:pic>
-    </p:spTree>
-    <p:extLst>
-      <p:ext uri="{BB962C8B-B14F-4D97-AF65-F5344CB8AC3E}">
-        <p14:creationId xmlns:p14="http://schemas.microsoft.com/office/powerpoint/2010/main" val="2934159058"/>
       </p:ext>
     </p:extLst>
   </p:cSld>

</xml_diff>

<commit_message>
error handling for views, ppt update, viewclientinfo, viewclientorders add
</commit_message>
<xml_diff>
--- a/P1 presentation.pptx
+++ b/P1 presentation.pptx
@@ -349,7 +349,7 @@
           <a:p>
             <a:fld id="{0A4C7DD1-2D06-47FD-80F0-DC791A43F5AA}" type="datetimeFigureOut">
               <a:rPr lang="en-US" smtClean="0"/>
-              <a:t>10/22/2021</a:t>
+              <a:t>10/23/2021</a:t>
             </a:fld>
             <a:endParaRPr lang="en-US"/>
           </a:p>
@@ -557,7 +557,7 @@
           <a:p>
             <a:fld id="{0A4C7DD1-2D06-47FD-80F0-DC791A43F5AA}" type="datetimeFigureOut">
               <a:rPr lang="en-US" smtClean="0"/>
-              <a:t>10/22/2021</a:t>
+              <a:t>10/23/2021</a:t>
             </a:fld>
             <a:endParaRPr lang="en-US"/>
           </a:p>
@@ -813,7 +813,7 @@
           <a:p>
             <a:fld id="{0A4C7DD1-2D06-47FD-80F0-DC791A43F5AA}" type="datetimeFigureOut">
               <a:rPr lang="en-US" smtClean="0"/>
-              <a:t>10/22/2021</a:t>
+              <a:t>10/23/2021</a:t>
             </a:fld>
             <a:endParaRPr lang="en-US"/>
           </a:p>
@@ -983,7 +983,7 @@
           <a:p>
             <a:fld id="{0A4C7DD1-2D06-47FD-80F0-DC791A43F5AA}" type="datetimeFigureOut">
               <a:rPr lang="en-US" smtClean="0"/>
-              <a:t>10/22/2021</a:t>
+              <a:t>10/23/2021</a:t>
             </a:fld>
             <a:endParaRPr lang="en-US"/>
           </a:p>
@@ -1326,7 +1326,7 @@
           <a:p>
             <a:fld id="{0A4C7DD1-2D06-47FD-80F0-DC791A43F5AA}" type="datetimeFigureOut">
               <a:rPr lang="en-US" smtClean="0"/>
-              <a:t>10/22/2021</a:t>
+              <a:t>10/23/2021</a:t>
             </a:fld>
             <a:endParaRPr lang="en-US"/>
           </a:p>
@@ -1601,7 +1601,7 @@
           <a:p>
             <a:fld id="{0A4C7DD1-2D06-47FD-80F0-DC791A43F5AA}" type="datetimeFigureOut">
               <a:rPr lang="en-US" smtClean="0"/>
-              <a:t>10/22/2021</a:t>
+              <a:t>10/23/2021</a:t>
             </a:fld>
             <a:endParaRPr lang="en-US"/>
           </a:p>
@@ -1980,7 +1980,7 @@
           <a:p>
             <a:fld id="{0A4C7DD1-2D06-47FD-80F0-DC791A43F5AA}" type="datetimeFigureOut">
               <a:rPr lang="en-US" smtClean="0"/>
-              <a:t>10/22/2021</a:t>
+              <a:t>10/23/2021</a:t>
             </a:fld>
             <a:endParaRPr lang="en-US"/>
           </a:p>
@@ -2098,7 +2098,7 @@
           <a:p>
             <a:fld id="{0A4C7DD1-2D06-47FD-80F0-DC791A43F5AA}" type="datetimeFigureOut">
               <a:rPr lang="en-US" smtClean="0"/>
-              <a:t>10/22/2021</a:t>
+              <a:t>10/23/2021</a:t>
             </a:fld>
             <a:endParaRPr lang="en-US"/>
           </a:p>
@@ -2269,7 +2269,7 @@
           <a:p>
             <a:fld id="{0A4C7DD1-2D06-47FD-80F0-DC791A43F5AA}" type="datetimeFigureOut">
               <a:rPr lang="en-US" smtClean="0"/>
-              <a:t>10/22/2021</a:t>
+              <a:t>10/23/2021</a:t>
             </a:fld>
             <a:endParaRPr lang="en-US"/>
           </a:p>
@@ -2623,7 +2623,7 @@
           <a:p>
             <a:fld id="{0A4C7DD1-2D06-47FD-80F0-DC791A43F5AA}" type="datetimeFigureOut">
               <a:rPr lang="en-US" smtClean="0"/>
-              <a:t>10/22/2021</a:t>
+              <a:t>10/23/2021</a:t>
             </a:fld>
             <a:endParaRPr lang="en-US"/>
           </a:p>
@@ -3000,7 +3000,7 @@
           <a:p>
             <a:fld id="{0A4C7DD1-2D06-47FD-80F0-DC791A43F5AA}" type="datetimeFigureOut">
               <a:rPr lang="en-US" smtClean="0"/>
-              <a:t>10/22/2021</a:t>
+              <a:t>10/23/2021</a:t>
             </a:fld>
             <a:endParaRPr lang="en-US"/>
           </a:p>
@@ -3287,7 +3287,7 @@
           <a:p>
             <a:fld id="{0A4C7DD1-2D06-47FD-80F0-DC791A43F5AA}" type="datetimeFigureOut">
               <a:rPr lang="en-US" smtClean="0"/>
-              <a:t>10/22/2021</a:t>
+              <a:t>10/23/2021</a:t>
             </a:fld>
             <a:endParaRPr lang="en-US"/>
           </a:p>
@@ -4474,13 +4474,13 @@
   <p:clrMapOvr>
     <a:masterClrMapping/>
   </p:clrMapOvr>
-  <mc:AlternateContent xmlns:mc="http://schemas.openxmlformats.org/markup-compatibility/2006">
-    <mc:Choice xmlns:p14="http://schemas.microsoft.com/office/powerpoint/2010/main" Requires="p14">
+  <mc:AlternateContent xmlns:mc="http://schemas.openxmlformats.org/markup-compatibility/2006" xmlns:p14="http://schemas.microsoft.com/office/powerpoint/2010/main">
+    <mc:Choice Requires="p14">
       <p:transition spd="med" p14:dur="700">
         <p:fade/>
       </p:transition>
     </mc:Choice>
-    <mc:Fallback>
+    <mc:Fallback xmlns="">
       <p:transition spd="med">
         <p:fade/>
       </p:transition>
@@ -4817,8 +4817,8 @@
         </p:nvSpPr>
         <p:spPr>
           <a:xfrm>
-            <a:off x="4800600" y="731520"/>
-            <a:ext cx="7167880" cy="5257800"/>
+            <a:off x="4800600" y="731519"/>
+            <a:ext cx="7167880" cy="5850255"/>
           </a:xfrm>
         </p:spPr>
         <p:txBody>
@@ -4833,7 +4833,47 @@
             </a:pPr>
             <a:r>
               <a:rPr lang="en-US" sz="3200" dirty="0"/>
+              <a:t>Dropdown selector menu</a:t>
+            </a:r>
+          </a:p>
+          <a:p>
+            <a:pPr lvl="1">
+              <a:buFont typeface="Wingdings" panose="05000000000000000000" pitchFamily="2" charset="2"/>
+              <a:buChar char="ü"/>
+            </a:pPr>
+            <a:r>
+              <a:rPr lang="en-US" sz="3000" dirty="0"/>
               <a:t>Delete clients, orders, vendor inventory</a:t>
+            </a:r>
+          </a:p>
+          <a:p>
+            <a:pPr lvl="1">
+              <a:buFont typeface="Wingdings" panose="05000000000000000000" pitchFamily="2" charset="2"/>
+              <a:buChar char="ü"/>
+            </a:pPr>
+            <a:r>
+              <a:rPr lang="en-US" sz="3000" dirty="0"/>
+              <a:t>View client info, orders, totals, subtotals, items not found</a:t>
+            </a:r>
+          </a:p>
+          <a:p>
+            <a:pPr lvl="1">
+              <a:buFont typeface="Wingdings" panose="05000000000000000000" pitchFamily="2" charset="2"/>
+              <a:buChar char="ü"/>
+            </a:pPr>
+            <a:r>
+              <a:rPr lang="en-US" sz="3000" dirty="0"/>
+              <a:t>Read in excel clients to database</a:t>
+            </a:r>
+          </a:p>
+          <a:p>
+            <a:pPr lvl="1">
+              <a:buFont typeface="Wingdings" panose="05000000000000000000" pitchFamily="2" charset="2"/>
+              <a:buChar char="ü"/>
+            </a:pPr>
+            <a:r>
+              <a:rPr lang="en-US" sz="3000" dirty="0"/>
+              <a:t>Read in test excel vendor to database</a:t>
             </a:r>
           </a:p>
           <a:p>
@@ -4843,36 +4883,6 @@
             </a:pPr>
             <a:r>
               <a:rPr lang="en-US" sz="3200" dirty="0"/>
-              <a:t>View client info, totals, subtotals, items not found</a:t>
-            </a:r>
-          </a:p>
-          <a:p>
-            <a:pPr>
-              <a:buFont typeface="Wingdings" panose="05000000000000000000" pitchFamily="2" charset="2"/>
-              <a:buChar char="ü"/>
-            </a:pPr>
-            <a:r>
-              <a:rPr lang="en-US" sz="3200" dirty="0"/>
-              <a:t>Read in excel clients to database</a:t>
-            </a:r>
-          </a:p>
-          <a:p>
-            <a:pPr>
-              <a:buFont typeface="Wingdings" panose="05000000000000000000" pitchFamily="2" charset="2"/>
-              <a:buChar char="ü"/>
-            </a:pPr>
-            <a:r>
-              <a:rPr lang="en-US" sz="3200" dirty="0"/>
-              <a:t>Read in test excel vendor to database</a:t>
-            </a:r>
-          </a:p>
-          <a:p>
-            <a:pPr>
-              <a:buFont typeface="Wingdings" panose="05000000000000000000" pitchFamily="2" charset="2"/>
-              <a:buChar char="ü"/>
-            </a:pPr>
-            <a:r>
-              <a:rPr lang="en-US" sz="3200" dirty="0"/>
               <a:t>Error handling </a:t>
             </a:r>
           </a:p>
@@ -4883,7 +4893,25 @@
             </a:pPr>
             <a:r>
               <a:rPr lang="en-US" sz="3000" dirty="0"/>
-              <a:t>For adding clients</a:t>
+              <a:t>For adding clients (input values check)</a:t>
+            </a:r>
+          </a:p>
+          <a:p>
+            <a:pPr lvl="1">
+              <a:buFont typeface="Wingdings" panose="05000000000000000000" pitchFamily="2" charset="2"/>
+              <a:buChar char="ü"/>
+            </a:pPr>
+            <a:r>
+              <a:rPr lang="en-US" sz="3000" dirty="0"/>
+              <a:t>For views (empty query </a:t>
+            </a:r>
+            <a:r>
+              <a:rPr lang="en-US" sz="3000" dirty="0" err="1"/>
+              <a:t>datatable</a:t>
+            </a:r>
+            <a:r>
+              <a:rPr lang="en-US" sz="3000" dirty="0"/>
+              <a:t> check)</a:t>
             </a:r>
           </a:p>
           <a:p>
@@ -4930,10 +4958,81 @@
         </p:nvSpPr>
         <p:spPr/>
         <p:txBody>
-          <a:bodyPr/>
+          <a:bodyPr>
+            <a:normAutofit lnSpcReduction="10000"/>
+          </a:bodyPr>
           <a:lstStyle/>
           <a:p>
-            <a:endParaRPr lang="en-US"/>
+            <a:pPr marL="0" marR="0" lvl="0" indent="0" algn="l" defTabSz="457200" rtl="0" eaLnBrk="1" fontAlgn="auto" latinLnBrk="0" hangingPunct="1">
+              <a:lnSpc>
+                <a:spcPct val="100000"/>
+              </a:lnSpc>
+              <a:spcBef>
+                <a:spcPts val="0"/>
+              </a:spcBef>
+              <a:spcAft>
+                <a:spcPts val="0"/>
+              </a:spcAft>
+              <a:buClrTx/>
+              <a:buSzTx/>
+              <a:buFontTx/>
+              <a:buNone/>
+              <a:tabLst/>
+              <a:defRPr/>
+            </a:pPr>
+            <a:r>
+              <a:rPr kumimoji="0" lang="en-US" sz="3100" b="1" i="0" u="sng" strike="noStrike" kern="1200" cap="none" spc="0" normalizeH="0" baseline="0" noProof="0" dirty="0">
+                <a:ln>
+                  <a:noFill/>
+                </a:ln>
+                <a:solidFill>
+                  <a:srgbClr val="FFFFFF"/>
+                </a:solidFill>
+                <a:effectLst/>
+                <a:uLnTx/>
+                <a:uFillTx/>
+                <a:latin typeface="Calibri" panose="020F0502020204030204"/>
+                <a:ea typeface="+mn-ea"/>
+                <a:cs typeface="+mn-cs"/>
+              </a:rPr>
+              <a:t>Goal: </a:t>
+            </a:r>
+            <a:br>
+              <a:rPr kumimoji="0" lang="en-US" sz="3100" b="0" i="0" u="none" strike="noStrike" kern="1200" cap="none" spc="0" normalizeH="0" baseline="0" noProof="0" dirty="0">
+                <a:ln>
+                  <a:noFill/>
+                </a:ln>
+                <a:solidFill>
+                  <a:srgbClr val="FFFFFF"/>
+                </a:solidFill>
+                <a:effectLst/>
+                <a:uLnTx/>
+                <a:uFillTx/>
+                <a:latin typeface="Calibri" panose="020F0502020204030204"/>
+                <a:ea typeface="+mn-ea"/>
+                <a:cs typeface="+mn-cs"/>
+              </a:rPr>
+            </a:br>
+            <a:r>
+              <a:rPr kumimoji="0" lang="en-US" sz="3100" b="0" i="0" u="none" strike="noStrike" kern="1200" cap="none" spc="0" normalizeH="0" baseline="0" noProof="0" dirty="0">
+                <a:ln>
+                  <a:noFill/>
+                </a:ln>
+                <a:solidFill>
+                  <a:srgbClr val="FFFFFF"/>
+                </a:solidFill>
+                <a:effectLst/>
+                <a:uLnTx/>
+                <a:uFillTx/>
+                <a:latin typeface="Calibri" panose="020F0502020204030204"/>
+                <a:ea typeface="+mn-ea"/>
+                <a:cs typeface="+mn-cs"/>
+              </a:rPr>
+              <a:t>Be able to do everything within UiPath instead of having to use external SQL queries</a:t>
+            </a:r>
+          </a:p>
+          <a:p>
+            <a:endParaRPr lang="en-US" dirty="0"/>
           </a:p>
         </p:txBody>
       </p:sp>
@@ -4947,13 +5046,13 @@
   <p:clrMapOvr>
     <a:masterClrMapping/>
   </p:clrMapOvr>
-  <mc:AlternateContent xmlns:mc="http://schemas.openxmlformats.org/markup-compatibility/2006">
-    <mc:Choice xmlns:p14="http://schemas.microsoft.com/office/powerpoint/2010/main" Requires="p14">
+  <mc:AlternateContent xmlns:mc="http://schemas.openxmlformats.org/markup-compatibility/2006" xmlns:p14="http://schemas.microsoft.com/office/powerpoint/2010/main">
+    <mc:Choice Requires="p14">
       <p:transition spd="med" p14:dur="700">
         <p:fade/>
       </p:transition>
     </mc:Choice>
-    <mc:Fallback>
+    <mc:Fallback xmlns="">
       <p:transition spd="med">
         <p:fade/>
       </p:transition>
@@ -4980,7 +5079,7 @@
                             </p:stCondLst>
                             <p:childTnLst>
                               <p:par>
-                                <p:cTn id="5" presetID="10" presetClass="entr" presetSubtype="0" fill="hold" nodeType="clickEffect">
+                                <p:cTn id="5" presetID="10" presetClass="entr" presetSubtype="0" fill="hold" grpId="0" nodeType="clickEffect">
                                   <p:stCondLst>
                                     <p:cond delay="0"/>
                                   </p:stCondLst>
@@ -5014,6 +5113,178 @@
                                           <p:spTgt spid="3">
                                             <p:txEl>
                                               <p:pRg st="0" end="0"/>
+                                            </p:txEl>
+                                          </p:spTgt>
+                                        </p:tgtEl>
+                                      </p:cBhvr>
+                                    </p:animEffect>
+                                  </p:childTnLst>
+                                </p:cTn>
+                              </p:par>
+                              <p:par>
+                                <p:cTn id="8" presetID="10" presetClass="entr" presetSubtype="0" fill="hold" grpId="0" nodeType="withEffect">
+                                  <p:stCondLst>
+                                    <p:cond delay="0"/>
+                                  </p:stCondLst>
+                                  <p:childTnLst>
+                                    <p:set>
+                                      <p:cBhvr>
+                                        <p:cTn id="9" dur="1" fill="hold">
+                                          <p:stCondLst>
+                                            <p:cond delay="0"/>
+                                          </p:stCondLst>
+                                        </p:cTn>
+                                        <p:tgtEl>
+                                          <p:spTgt spid="3">
+                                            <p:txEl>
+                                              <p:pRg st="1" end="1"/>
+                                            </p:txEl>
+                                          </p:spTgt>
+                                        </p:tgtEl>
+                                        <p:attrNameLst>
+                                          <p:attrName>style.visibility</p:attrName>
+                                        </p:attrNameLst>
+                                      </p:cBhvr>
+                                      <p:to>
+                                        <p:strVal val="visible"/>
+                                      </p:to>
+                                    </p:set>
+                                    <p:animEffect transition="in" filter="fade">
+                                      <p:cBhvr>
+                                        <p:cTn id="10" dur="500"/>
+                                        <p:tgtEl>
+                                          <p:spTgt spid="3">
+                                            <p:txEl>
+                                              <p:pRg st="1" end="1"/>
+                                            </p:txEl>
+                                          </p:spTgt>
+                                        </p:tgtEl>
+                                      </p:cBhvr>
+                                    </p:animEffect>
+                                  </p:childTnLst>
+                                </p:cTn>
+                              </p:par>
+                              <p:par>
+                                <p:cTn id="11" presetID="10" presetClass="entr" presetSubtype="0" fill="hold" grpId="0" nodeType="withEffect">
+                                  <p:stCondLst>
+                                    <p:cond delay="0"/>
+                                  </p:stCondLst>
+                                  <p:childTnLst>
+                                    <p:set>
+                                      <p:cBhvr>
+                                        <p:cTn id="12" dur="1" fill="hold">
+                                          <p:stCondLst>
+                                            <p:cond delay="0"/>
+                                          </p:stCondLst>
+                                        </p:cTn>
+                                        <p:tgtEl>
+                                          <p:spTgt spid="3">
+                                            <p:txEl>
+                                              <p:pRg st="2" end="2"/>
+                                            </p:txEl>
+                                          </p:spTgt>
+                                        </p:tgtEl>
+                                        <p:attrNameLst>
+                                          <p:attrName>style.visibility</p:attrName>
+                                        </p:attrNameLst>
+                                      </p:cBhvr>
+                                      <p:to>
+                                        <p:strVal val="visible"/>
+                                      </p:to>
+                                    </p:set>
+                                    <p:animEffect transition="in" filter="fade">
+                                      <p:cBhvr>
+                                        <p:cTn id="13" dur="500"/>
+                                        <p:tgtEl>
+                                          <p:spTgt spid="3">
+                                            <p:txEl>
+                                              <p:pRg st="2" end="2"/>
+                                            </p:txEl>
+                                          </p:spTgt>
+                                        </p:tgtEl>
+                                      </p:cBhvr>
+                                    </p:animEffect>
+                                  </p:childTnLst>
+                                </p:cTn>
+                              </p:par>
+                              <p:par>
+                                <p:cTn id="14" presetID="10" presetClass="entr" presetSubtype="0" fill="hold" grpId="0" nodeType="withEffect">
+                                  <p:stCondLst>
+                                    <p:cond delay="0"/>
+                                  </p:stCondLst>
+                                  <p:childTnLst>
+                                    <p:set>
+                                      <p:cBhvr>
+                                        <p:cTn id="15" dur="1" fill="hold">
+                                          <p:stCondLst>
+                                            <p:cond delay="0"/>
+                                          </p:stCondLst>
+                                        </p:cTn>
+                                        <p:tgtEl>
+                                          <p:spTgt spid="3">
+                                            <p:txEl>
+                                              <p:pRg st="3" end="3"/>
+                                            </p:txEl>
+                                          </p:spTgt>
+                                        </p:tgtEl>
+                                        <p:attrNameLst>
+                                          <p:attrName>style.visibility</p:attrName>
+                                        </p:attrNameLst>
+                                      </p:cBhvr>
+                                      <p:to>
+                                        <p:strVal val="visible"/>
+                                      </p:to>
+                                    </p:set>
+                                    <p:animEffect transition="in" filter="fade">
+                                      <p:cBhvr>
+                                        <p:cTn id="16" dur="500"/>
+                                        <p:tgtEl>
+                                          <p:spTgt spid="3">
+                                            <p:txEl>
+                                              <p:pRg st="3" end="3"/>
+                                            </p:txEl>
+                                          </p:spTgt>
+                                        </p:tgtEl>
+                                      </p:cBhvr>
+                                    </p:animEffect>
+                                  </p:childTnLst>
+                                </p:cTn>
+                              </p:par>
+                              <p:par>
+                                <p:cTn id="17" presetID="10" presetClass="entr" presetSubtype="0" fill="hold" grpId="0" nodeType="withEffect">
+                                  <p:stCondLst>
+                                    <p:cond delay="0"/>
+                                  </p:stCondLst>
+                                  <p:childTnLst>
+                                    <p:set>
+                                      <p:cBhvr>
+                                        <p:cTn id="18" dur="1" fill="hold">
+                                          <p:stCondLst>
+                                            <p:cond delay="0"/>
+                                          </p:stCondLst>
+                                        </p:cTn>
+                                        <p:tgtEl>
+                                          <p:spTgt spid="3">
+                                            <p:txEl>
+                                              <p:pRg st="4" end="4"/>
+                                            </p:txEl>
+                                          </p:spTgt>
+                                        </p:tgtEl>
+                                        <p:attrNameLst>
+                                          <p:attrName>style.visibility</p:attrName>
+                                        </p:attrNameLst>
+                                      </p:cBhvr>
+                                      <p:to>
+                                        <p:strVal val="visible"/>
+                                      </p:to>
+                                    </p:set>
+                                    <p:animEffect transition="in" filter="fade">
+                                      <p:cBhvr>
+                                        <p:cTn id="19" dur="500"/>
+                                        <p:tgtEl>
+                                          <p:spTgt spid="3">
+                                            <p:txEl>
+                                              <p:pRg st="4" end="4"/>
                                             </p:txEl>
                                           </p:spTgt>
                                         </p:tgtEl>
@@ -5029,26 +5300,26 @@
                     </p:cTn>
                   </p:par>
                   <p:par>
-                    <p:cTn id="8" fill="hold">
+                    <p:cTn id="20" fill="hold">
                       <p:stCondLst>
                         <p:cond delay="indefinite"/>
                       </p:stCondLst>
                       <p:childTnLst>
                         <p:par>
-                          <p:cTn id="9" fill="hold">
+                          <p:cTn id="21" fill="hold">
                             <p:stCondLst>
                               <p:cond delay="0"/>
                             </p:stCondLst>
                             <p:childTnLst>
                               <p:par>
-                                <p:cTn id="10" presetID="10" presetClass="entr" presetSubtype="0" fill="hold" nodeType="clickEffect">
+                                <p:cTn id="22" presetID="10" presetClass="entr" presetSubtype="0" fill="hold" grpId="0" nodeType="clickEffect">
                                   <p:stCondLst>
                                     <p:cond delay="0"/>
                                   </p:stCondLst>
                                   <p:childTnLst>
                                     <p:set>
                                       <p:cBhvr>
-                                        <p:cTn id="11" dur="1" fill="hold">
+                                        <p:cTn id="23" dur="1" fill="hold">
                                           <p:stCondLst>
                                             <p:cond delay="0"/>
                                           </p:stCondLst>
@@ -5056,7 +5327,7 @@
                                         <p:tgtEl>
                                           <p:spTgt spid="3">
                                             <p:txEl>
-                                              <p:pRg st="1" end="1"/>
+                                              <p:pRg st="5" end="5"/>
                                             </p:txEl>
                                           </p:spTgt>
                                         </p:tgtEl>
@@ -5070,11 +5341,11 @@
                                     </p:set>
                                     <p:animEffect transition="in" filter="fade">
                                       <p:cBhvr>
-                                        <p:cTn id="12" dur="500"/>
+                                        <p:cTn id="24" dur="500"/>
                                         <p:tgtEl>
                                           <p:spTgt spid="3">
                                             <p:txEl>
-                                              <p:pRg st="1" end="1"/>
+                                              <p:pRg st="5" end="5"/>
                                             </p:txEl>
                                           </p:spTgt>
                                         </p:tgtEl>
@@ -5083,33 +5354,15 @@
                                   </p:childTnLst>
                                 </p:cTn>
                               </p:par>
-                            </p:childTnLst>
-                          </p:cTn>
-                        </p:par>
-                      </p:childTnLst>
-                    </p:cTn>
-                  </p:par>
-                  <p:par>
-                    <p:cTn id="13" fill="hold">
-                      <p:stCondLst>
-                        <p:cond delay="indefinite"/>
-                      </p:stCondLst>
-                      <p:childTnLst>
-                        <p:par>
-                          <p:cTn id="14" fill="hold">
-                            <p:stCondLst>
-                              <p:cond delay="0"/>
-                            </p:stCondLst>
-                            <p:childTnLst>
                               <p:par>
-                                <p:cTn id="15" presetID="10" presetClass="entr" presetSubtype="0" fill="hold" nodeType="clickEffect">
+                                <p:cTn id="25" presetID="10" presetClass="entr" presetSubtype="0" fill="hold" grpId="0" nodeType="withEffect">
                                   <p:stCondLst>
                                     <p:cond delay="0"/>
                                   </p:stCondLst>
                                   <p:childTnLst>
                                     <p:set>
                                       <p:cBhvr>
-                                        <p:cTn id="16" dur="1" fill="hold">
+                                        <p:cTn id="26" dur="1" fill="hold">
                                           <p:stCondLst>
                                             <p:cond delay="0"/>
                                           </p:stCondLst>
@@ -5117,7 +5370,7 @@
                                         <p:tgtEl>
                                           <p:spTgt spid="3">
                                             <p:txEl>
-                                              <p:pRg st="2" end="2"/>
+                                              <p:pRg st="6" end="6"/>
                                             </p:txEl>
                                           </p:spTgt>
                                         </p:tgtEl>
@@ -5131,11 +5384,11 @@
                                     </p:set>
                                     <p:animEffect transition="in" filter="fade">
                                       <p:cBhvr>
-                                        <p:cTn id="17" dur="500"/>
+                                        <p:cTn id="27" dur="500"/>
                                         <p:tgtEl>
                                           <p:spTgt spid="3">
                                             <p:txEl>
-                                              <p:pRg st="2" end="2"/>
+                                              <p:pRg st="6" end="6"/>
                                             </p:txEl>
                                           </p:spTgt>
                                         </p:tgtEl>
@@ -5144,33 +5397,15 @@
                                   </p:childTnLst>
                                 </p:cTn>
                               </p:par>
-                            </p:childTnLst>
-                          </p:cTn>
-                        </p:par>
-                      </p:childTnLst>
-                    </p:cTn>
-                  </p:par>
-                  <p:par>
-                    <p:cTn id="18" fill="hold">
-                      <p:stCondLst>
-                        <p:cond delay="indefinite"/>
-                      </p:stCondLst>
-                      <p:childTnLst>
-                        <p:par>
-                          <p:cTn id="19" fill="hold">
-                            <p:stCondLst>
-                              <p:cond delay="0"/>
-                            </p:stCondLst>
-                            <p:childTnLst>
                               <p:par>
-                                <p:cTn id="20" presetID="10" presetClass="entr" presetSubtype="0" fill="hold" nodeType="clickEffect">
+                                <p:cTn id="28" presetID="10" presetClass="entr" presetSubtype="0" fill="hold" grpId="0" nodeType="withEffect">
                                   <p:stCondLst>
                                     <p:cond delay="0"/>
                                   </p:stCondLst>
                                   <p:childTnLst>
                                     <p:set>
                                       <p:cBhvr>
-                                        <p:cTn id="21" dur="1" fill="hold">
+                                        <p:cTn id="29" dur="1" fill="hold">
                                           <p:stCondLst>
                                             <p:cond delay="0"/>
                                           </p:stCondLst>
@@ -5178,7 +5413,7 @@
                                         <p:tgtEl>
                                           <p:spTgt spid="3">
                                             <p:txEl>
-                                              <p:pRg st="3" end="3"/>
+                                              <p:pRg st="7" end="7"/>
                                             </p:txEl>
                                           </p:spTgt>
                                         </p:tgtEl>
@@ -5192,11 +5427,11 @@
                                     </p:set>
                                     <p:animEffect transition="in" filter="fade">
                                       <p:cBhvr>
-                                        <p:cTn id="22" dur="500"/>
+                                        <p:cTn id="30" dur="500"/>
                                         <p:tgtEl>
                                           <p:spTgt spid="3">
                                             <p:txEl>
-                                              <p:pRg st="3" end="3"/>
+                                              <p:pRg st="7" end="7"/>
                                             </p:txEl>
                                           </p:spTgt>
                                         </p:tgtEl>
@@ -5205,33 +5440,15 @@
                                   </p:childTnLst>
                                 </p:cTn>
                               </p:par>
-                            </p:childTnLst>
-                          </p:cTn>
-                        </p:par>
-                      </p:childTnLst>
-                    </p:cTn>
-                  </p:par>
-                  <p:par>
-                    <p:cTn id="23" fill="hold">
-                      <p:stCondLst>
-                        <p:cond delay="indefinite"/>
-                      </p:stCondLst>
-                      <p:childTnLst>
-                        <p:par>
-                          <p:cTn id="24" fill="hold">
-                            <p:stCondLst>
-                              <p:cond delay="0"/>
-                            </p:stCondLst>
-                            <p:childTnLst>
                               <p:par>
-                                <p:cTn id="25" presetID="10" presetClass="entr" presetSubtype="0" fill="hold" nodeType="clickEffect">
+                                <p:cTn id="31" presetID="10" presetClass="entr" presetSubtype="0" fill="hold" grpId="0" nodeType="withEffect">
                                   <p:stCondLst>
                                     <p:cond delay="0"/>
                                   </p:stCondLst>
                                   <p:childTnLst>
                                     <p:set>
                                       <p:cBhvr>
-                                        <p:cTn id="26" dur="1" fill="hold">
+                                        <p:cTn id="32" dur="1" fill="hold">
                                           <p:stCondLst>
                                             <p:cond delay="0"/>
                                           </p:stCondLst>
@@ -5239,7 +5456,7 @@
                                         <p:tgtEl>
                                           <p:spTgt spid="3">
                                             <p:txEl>
-                                              <p:pRg st="4" end="4"/>
+                                              <p:pRg st="8" end="8"/>
                                             </p:txEl>
                                           </p:spTgt>
                                         </p:tgtEl>
@@ -5253,97 +5470,11 @@
                                     </p:set>
                                     <p:animEffect transition="in" filter="fade">
                                       <p:cBhvr>
-                                        <p:cTn id="27" dur="500"/>
+                                        <p:cTn id="33" dur="500"/>
                                         <p:tgtEl>
                                           <p:spTgt spid="3">
                                             <p:txEl>
-                                              <p:pRg st="4" end="4"/>
-                                            </p:txEl>
-                                          </p:spTgt>
-                                        </p:tgtEl>
-                                      </p:cBhvr>
-                                    </p:animEffect>
-                                  </p:childTnLst>
-                                </p:cTn>
-                              </p:par>
-                              <p:par>
-                                <p:cTn id="28" presetID="10" presetClass="entr" presetSubtype="0" fill="hold" nodeType="withEffect">
-                                  <p:stCondLst>
-                                    <p:cond delay="0"/>
-                                  </p:stCondLst>
-                                  <p:childTnLst>
-                                    <p:set>
-                                      <p:cBhvr>
-                                        <p:cTn id="29" dur="1" fill="hold">
-                                          <p:stCondLst>
-                                            <p:cond delay="0"/>
-                                          </p:stCondLst>
-                                        </p:cTn>
-                                        <p:tgtEl>
-                                          <p:spTgt spid="3">
-                                            <p:txEl>
-                                              <p:pRg st="5" end="5"/>
-                                            </p:txEl>
-                                          </p:spTgt>
-                                        </p:tgtEl>
-                                        <p:attrNameLst>
-                                          <p:attrName>style.visibility</p:attrName>
-                                        </p:attrNameLst>
-                                      </p:cBhvr>
-                                      <p:to>
-                                        <p:strVal val="visible"/>
-                                      </p:to>
-                                    </p:set>
-                                    <p:animEffect transition="in" filter="fade">
-                                      <p:cBhvr>
-                                        <p:cTn id="30" dur="500"/>
-                                        <p:tgtEl>
-                                          <p:spTgt spid="3">
-                                            <p:txEl>
-                                              <p:pRg st="5" end="5"/>
-                                            </p:txEl>
-                                          </p:spTgt>
-                                        </p:tgtEl>
-                                      </p:cBhvr>
-                                    </p:animEffect>
-                                  </p:childTnLst>
-                                </p:cTn>
-                              </p:par>
-                              <p:par>
-                                <p:cTn id="31" presetID="10" presetClass="entr" presetSubtype="0" fill="hold" nodeType="withEffect">
-                                  <p:stCondLst>
-                                    <p:cond delay="0"/>
-                                  </p:stCondLst>
-                                  <p:childTnLst>
-                                    <p:set>
-                                      <p:cBhvr>
-                                        <p:cTn id="32" dur="1" fill="hold">
-                                          <p:stCondLst>
-                                            <p:cond delay="0"/>
-                                          </p:stCondLst>
-                                        </p:cTn>
-                                        <p:tgtEl>
-                                          <p:spTgt spid="3">
-                                            <p:txEl>
-                                              <p:pRg st="6" end="6"/>
-                                            </p:txEl>
-                                          </p:spTgt>
-                                        </p:tgtEl>
-                                        <p:attrNameLst>
-                                          <p:attrName>style.visibility</p:attrName>
-                                        </p:attrNameLst>
-                                      </p:cBhvr>
-                                      <p:to>
-                                        <p:strVal val="visible"/>
-                                      </p:to>
-                                    </p:set>
-                                    <p:animEffect transition="in" filter="fade">
-                                      <p:cBhvr>
-                                        <p:cTn id="33" dur="500"/>
-                                        <p:tgtEl>
-                                          <p:spTgt spid="3">
-                                            <p:txEl>
-                                              <p:pRg st="6" end="6"/>
+                                              <p:pRg st="8" end="8"/>
                                             </p:txEl>
                                           </p:spTgt>
                                         </p:tgtEl>
@@ -5379,6 +5510,9 @@
         </p:cTn>
       </p:par>
     </p:tnLst>
+    <p:bldLst>
+      <p:bldP spid="3" grpId="0" build="p"/>
+    </p:bldLst>
   </p:timing>
 </p:sld>
 </file>
@@ -6407,13 +6541,13 @@
   <p:clrMapOvr>
     <a:masterClrMapping/>
   </p:clrMapOvr>
-  <mc:AlternateContent xmlns:mc="http://schemas.openxmlformats.org/markup-compatibility/2006">
-    <mc:Choice xmlns:p14="http://schemas.microsoft.com/office/powerpoint/2010/main" Requires="p14">
+  <mc:AlternateContent xmlns:mc="http://schemas.openxmlformats.org/markup-compatibility/2006" xmlns:p14="http://schemas.microsoft.com/office/powerpoint/2010/main">
+    <mc:Choice Requires="p14">
       <p:transition spd="med" p14:dur="700">
         <p:fade/>
       </p:transition>
     </mc:Choice>
-    <mc:Fallback>
+    <mc:Fallback xmlns="">
       <p:transition spd="med">
         <p:fade/>
       </p:transition>
@@ -6714,54 +6848,6 @@
           </a:fontRef>
         </p:style>
       </p:sp>
-      <p:pic>
-        <p:nvPicPr>
-          <p:cNvPr id="4" name="Picture 3" descr="Graphical user interface, text, application&#10;&#10;Description automatically generated">
-            <a:extLst>
-              <a:ext uri="{FF2B5EF4-FFF2-40B4-BE49-F238E27FC236}">
-                <a16:creationId xmlns:a16="http://schemas.microsoft.com/office/drawing/2014/main" id="{89388754-8921-4104-BB59-2728FEE220C1}"/>
-              </a:ext>
-            </a:extLst>
-          </p:cNvPr>
-          <p:cNvPicPr>
-            <a:picLocks noChangeAspect="1"/>
-          </p:cNvPicPr>
-          <p:nvPr/>
-        </p:nvPicPr>
-        <p:blipFill>
-          <a:blip r:embed="rId2">
-            <a:extLst>
-              <a:ext uri="{28A0092B-C50C-407E-A947-70E740481C1C}">
-                <a14:useLocalDpi xmlns:a14="http://schemas.microsoft.com/office/drawing/2010/main" val="0"/>
-              </a:ext>
-            </a:extLst>
-          </a:blip>
-          <a:stretch>
-            <a:fillRect/>
-          </a:stretch>
-        </p:blipFill>
-        <p:spPr>
-          <a:xfrm>
-            <a:off x="5150902" y="352788"/>
-            <a:ext cx="5986463" cy="6152424"/>
-          </a:xfrm>
-          <a:prstGeom prst="rect">
-            <a:avLst/>
-          </a:prstGeom>
-          <a:ln w="38100">
-            <a:solidFill>
-              <a:schemeClr val="accent1"/>
-            </a:solidFill>
-          </a:ln>
-          <a:effectLst>
-            <a:outerShdw blurRad="50800" dist="38100" dir="2700000" algn="tl" rotWithShape="0">
-              <a:prstClr val="black">
-                <a:alpha val="40000"/>
-              </a:prstClr>
-            </a:outerShdw>
-          </a:effectLst>
-        </p:spPr>
-      </p:pic>
       <p:sp>
         <p:nvSpPr>
           <p:cNvPr id="8" name="Title 1">
@@ -6852,6 +6938,54 @@
           </a:p>
         </p:txBody>
       </p:sp>
+      <p:pic>
+        <p:nvPicPr>
+          <p:cNvPr id="5" name="Picture 4" descr="Graphical user interface, text, application&#10;&#10;Description automatically generated">
+            <a:extLst>
+              <a:ext uri="{FF2B5EF4-FFF2-40B4-BE49-F238E27FC236}">
+                <a16:creationId xmlns:a16="http://schemas.microsoft.com/office/drawing/2014/main" id="{8377A927-7947-4A08-9F10-D90BBAC2579D}"/>
+              </a:ext>
+            </a:extLst>
+          </p:cNvPr>
+          <p:cNvPicPr>
+            <a:picLocks noChangeAspect="1"/>
+          </p:cNvPicPr>
+          <p:nvPr/>
+        </p:nvPicPr>
+        <p:blipFill>
+          <a:blip r:embed="rId2">
+            <a:extLst>
+              <a:ext uri="{28A0092B-C50C-407E-A947-70E740481C1C}">
+                <a14:useLocalDpi xmlns:a14="http://schemas.microsoft.com/office/drawing/2010/main" val="0"/>
+              </a:ext>
+            </a:extLst>
+          </a:blip>
+          <a:stretch>
+            <a:fillRect/>
+          </a:stretch>
+        </p:blipFill>
+        <p:spPr>
+          <a:xfrm>
+            <a:off x="5068851" y="423862"/>
+            <a:ext cx="6038144" cy="6205538"/>
+          </a:xfrm>
+          <a:prstGeom prst="rect">
+            <a:avLst/>
+          </a:prstGeom>
+          <a:ln w="38100">
+            <a:solidFill>
+              <a:schemeClr val="accent1"/>
+            </a:solidFill>
+          </a:ln>
+          <a:effectLst>
+            <a:outerShdw blurRad="50800" dist="38100" dir="2700000" algn="tl" rotWithShape="0">
+              <a:prstClr val="black">
+                <a:alpha val="40000"/>
+              </a:prstClr>
+            </a:outerShdw>
+          </a:effectLst>
+        </p:spPr>
+      </p:pic>
     </p:spTree>
     <p:extLst>
       <p:ext uri="{BB962C8B-B14F-4D97-AF65-F5344CB8AC3E}">
@@ -6862,13 +6996,13 @@
   <p:clrMapOvr>
     <a:masterClrMapping/>
   </p:clrMapOvr>
-  <mc:AlternateContent xmlns:mc="http://schemas.openxmlformats.org/markup-compatibility/2006">
-    <mc:Choice xmlns:p14="http://schemas.microsoft.com/office/powerpoint/2010/main" Requires="p14">
+  <mc:AlternateContent xmlns:mc="http://schemas.openxmlformats.org/markup-compatibility/2006" xmlns:p14="http://schemas.microsoft.com/office/powerpoint/2010/main">
+    <mc:Choice Requires="p14">
       <p:transition spd="med" p14:dur="700">
         <p:fade/>
       </p:transition>
     </mc:Choice>
-    <mc:Fallback>
+    <mc:Fallback xmlns="">
       <p:transition spd="med">
         <p:fade/>
       </p:transition>
@@ -6886,6 +7020,9 @@
                     <p:cTn id="3" fill="hold">
                       <p:stCondLst>
                         <p:cond delay="indefinite"/>
+                        <p:cond evt="onBegin" delay="0">
+                          <p:tn val="2"/>
+                        </p:cond>
                       </p:stCondLst>
                       <p:childTnLst>
                         <p:par>
@@ -6895,7 +7032,7 @@
                             </p:stCondLst>
                             <p:childTnLst>
                               <p:par>
-                                <p:cTn id="5" presetID="10" presetClass="entr" presetSubtype="0" fill="hold" nodeType="clickEffect">
+                                <p:cTn id="5" presetID="10" presetClass="entr" presetSubtype="0" fill="hold" grpId="0" nodeType="withEffect">
                                   <p:stCondLst>
                                     <p:cond delay="0"/>
                                   </p:stCondLst>
@@ -6908,7 +7045,7 @@
                                           </p:stCondLst>
                                         </p:cTn>
                                         <p:tgtEl>
-                                          <p:spTgt spid="4"/>
+                                          <p:spTgt spid="8"/>
                                         </p:tgtEl>
                                         <p:attrNameLst>
                                           <p:attrName>style.visibility</p:attrName>
@@ -6922,28 +7059,46 @@
                                       <p:cBhvr>
                                         <p:cTn id="7" dur="500"/>
                                         <p:tgtEl>
-                                          <p:spTgt spid="4"/>
+                                          <p:spTgt spid="8"/>
                                         </p:tgtEl>
                                       </p:cBhvr>
                                     </p:animEffect>
                                   </p:childTnLst>
                                 </p:cTn>
                               </p:par>
+                            </p:childTnLst>
+                          </p:cTn>
+                        </p:par>
+                      </p:childTnLst>
+                    </p:cTn>
+                  </p:par>
+                  <p:par>
+                    <p:cTn id="8" fill="hold">
+                      <p:stCondLst>
+                        <p:cond delay="indefinite"/>
+                      </p:stCondLst>
+                      <p:childTnLst>
+                        <p:par>
+                          <p:cTn id="9" fill="hold">
+                            <p:stCondLst>
+                              <p:cond delay="0"/>
+                            </p:stCondLst>
+                            <p:childTnLst>
                               <p:par>
-                                <p:cTn id="8" presetID="10" presetClass="entr" presetSubtype="0" fill="hold" grpId="0" nodeType="withEffect">
+                                <p:cTn id="10" presetID="10" presetClass="entr" presetSubtype="0" fill="hold" nodeType="clickEffect">
                                   <p:stCondLst>
                                     <p:cond delay="0"/>
                                   </p:stCondLst>
                                   <p:childTnLst>
                                     <p:set>
                                       <p:cBhvr>
-                                        <p:cTn id="9" dur="1" fill="hold">
+                                        <p:cTn id="11" dur="1" fill="hold">
                                           <p:stCondLst>
                                             <p:cond delay="0"/>
                                           </p:stCondLst>
                                         </p:cTn>
                                         <p:tgtEl>
-                                          <p:spTgt spid="8"/>
+                                          <p:spTgt spid="5"/>
                                         </p:tgtEl>
                                         <p:attrNameLst>
                                           <p:attrName>style.visibility</p:attrName>
@@ -6955,9 +7110,9 @@
                                     </p:set>
                                     <p:animEffect transition="in" filter="fade">
                                       <p:cBhvr>
-                                        <p:cTn id="10" dur="500"/>
-                                        <p:tgtEl>
-                                          <p:spTgt spid="8"/>
+                                        <p:cTn id="12" dur="500"/>
+                                        <p:tgtEl>
+                                          <p:spTgt spid="5"/>
                                         </p:tgtEl>
                                       </p:cBhvr>
                                     </p:animEffect>
@@ -8197,13 +8352,13 @@
   <p:clrMapOvr>
     <a:masterClrMapping/>
   </p:clrMapOvr>
-  <mc:AlternateContent xmlns:mc="http://schemas.openxmlformats.org/markup-compatibility/2006">
-    <mc:Choice xmlns:p14="http://schemas.microsoft.com/office/powerpoint/2010/main" Requires="p14">
+  <mc:AlternateContent xmlns:mc="http://schemas.openxmlformats.org/markup-compatibility/2006" xmlns:p14="http://schemas.microsoft.com/office/powerpoint/2010/main">
+    <mc:Choice Requires="p14">
       <p:transition spd="med" p14:dur="700">
         <p:fade/>
       </p:transition>
     </mc:Choice>
-    <mc:Fallback>
+    <mc:Fallback xmlns="">
       <p:transition spd="med">
         <p:fade/>
       </p:transition>
@@ -8719,13 +8874,13 @@
   <p:clrMapOvr>
     <a:masterClrMapping/>
   </p:clrMapOvr>
-  <mc:AlternateContent xmlns:mc="http://schemas.openxmlformats.org/markup-compatibility/2006">
-    <mc:Choice xmlns:p14="http://schemas.microsoft.com/office/powerpoint/2010/main" Requires="p14">
+  <mc:AlternateContent xmlns:mc="http://schemas.openxmlformats.org/markup-compatibility/2006" xmlns:p14="http://schemas.microsoft.com/office/powerpoint/2010/main">
+    <mc:Choice Requires="p14">
       <p:transition spd="med" p14:dur="700">
         <p:fade/>
       </p:transition>
     </mc:Choice>
-    <mc:Fallback>
+    <mc:Fallback xmlns="">
       <p:transition spd="med">
         <p:fade/>
       </p:transition>
@@ -10043,13 +10198,13 @@
   <p:clrMapOvr>
     <a:masterClrMapping/>
   </p:clrMapOvr>
-  <mc:AlternateContent xmlns:mc="http://schemas.openxmlformats.org/markup-compatibility/2006">
-    <mc:Choice xmlns:p14="http://schemas.microsoft.com/office/powerpoint/2010/main" Requires="p14">
+  <mc:AlternateContent xmlns:mc="http://schemas.openxmlformats.org/markup-compatibility/2006" xmlns:p14="http://schemas.microsoft.com/office/powerpoint/2010/main">
+    <mc:Choice Requires="p14">
       <p:transition spd="med" p14:dur="700">
         <p:fade/>
       </p:transition>
     </mc:Choice>
-    <mc:Fallback>
+    <mc:Fallback xmlns="">
       <p:transition spd="med">
         <p:fade/>
       </p:transition>
@@ -11023,7 +11178,7 @@
                   <a:srgbClr val="FFFFFF"/>
                 </a:solidFill>
               </a:rPr>
-              <a:t>Three vendors</a:t>
+              <a:t>Four vendors</a:t>
             </a:r>
             <a:br>
               <a:rPr lang="en-US" sz="4400" dirty="0">
@@ -11063,7 +11218,7 @@
         </p:nvSpPr>
         <p:spPr>
           <a:xfrm>
-            <a:off x="562301" y="389713"/>
+            <a:off x="583015" y="732613"/>
             <a:ext cx="3494428" cy="2103875"/>
           </a:xfrm>
           <a:prstGeom prst="rect">
@@ -11072,7 +11227,7 @@
         </p:spPr>
         <p:txBody>
           <a:bodyPr vert="horz" lIns="91440" tIns="45720" rIns="91440" bIns="45720" rtlCol="0" anchor="b">
-            <a:normAutofit/>
+            <a:normAutofit fontScale="92500"/>
           </a:bodyPr>
           <a:lstStyle>
             <a:lvl1pPr algn="l" defTabSz="914400" rtl="0" eaLnBrk="1" latinLnBrk="0" hangingPunct="1">
@@ -11107,7 +11262,7 @@
                   <a:srgbClr val="FFFFFF"/>
                 </a:solidFill>
               </a:rPr>
-              <a:t>Stationery</a:t>
+              <a:t>Stationery shop</a:t>
             </a:r>
           </a:p>
           <a:p>
@@ -11121,7 +11276,7 @@
                   <a:srgbClr val="FFFFFF"/>
                 </a:solidFill>
               </a:rPr>
-              <a:t>Food</a:t>
+              <a:t>Food shop</a:t>
             </a:r>
           </a:p>
           <a:p>
@@ -11135,8 +11290,27 @@
                   <a:srgbClr val="FFFFFF"/>
                 </a:solidFill>
               </a:rPr>
-              <a:t>Beverages</a:t>
-            </a:r>
+              <a:t>Beverages shop</a:t>
+            </a:r>
+          </a:p>
+          <a:p>
+            <a:pPr marL="571500" indent="-571500">
+              <a:buFontTx/>
+              <a:buChar char="-"/>
+            </a:pPr>
+            <a:r>
+              <a:rPr lang="en-US" sz="3600" dirty="0" err="1">
+                <a:solidFill>
+                  <a:srgbClr val="FFFFFF"/>
+                </a:solidFill>
+              </a:rPr>
+              <a:t>Pega</a:t>
+            </a:r>
+            <a:endParaRPr lang="en-US" sz="3600" dirty="0">
+              <a:solidFill>
+                <a:srgbClr val="FFFFFF"/>
+              </a:solidFill>
+            </a:endParaRPr>
           </a:p>
         </p:txBody>
       </p:sp>
@@ -11150,13 +11324,13 @@
   <p:clrMapOvr>
     <a:masterClrMapping/>
   </p:clrMapOvr>
-  <mc:AlternateContent xmlns:mc="http://schemas.openxmlformats.org/markup-compatibility/2006">
-    <mc:Choice xmlns:p14="http://schemas.microsoft.com/office/powerpoint/2010/main" Requires="p14">
+  <mc:AlternateContent xmlns:mc="http://schemas.openxmlformats.org/markup-compatibility/2006" xmlns:p14="http://schemas.microsoft.com/office/powerpoint/2010/main">
+    <mc:Choice Requires="p14">
       <p:transition spd="med" p14:dur="700">
         <p:fade/>
       </p:transition>
     </mc:Choice>
-    <mc:Fallback>
+    <mc:Fallback xmlns="">
       <p:transition spd="med">
         <p:fade/>
       </p:transition>
@@ -12101,7 +12275,7 @@
         <p:spPr>
           <a:xfrm>
             <a:off x="7788006" y="1796613"/>
-            <a:ext cx="1092735" cy="523220"/>
+            <a:ext cx="951671" cy="954107"/>
           </a:xfrm>
           <a:prstGeom prst="rect">
             <a:avLst/>
@@ -12123,8 +12297,15 @@
                   <a:srgbClr val="FF0000"/>
                 </a:solidFill>
               </a:rPr>
-              <a:t>Tables</a:t>
-            </a:r>
+              <a:t>Table</a:t>
+            </a:r>
+          </a:p>
+          <a:p>
+            <a:endParaRPr lang="en-US" sz="2800" dirty="0">
+              <a:solidFill>
+                <a:srgbClr val="FF0000"/>
+              </a:solidFill>
+            </a:endParaRPr>
           </a:p>
         </p:txBody>
       </p:sp>
@@ -12187,13 +12368,13 @@
   <p:clrMapOvr>
     <a:masterClrMapping/>
   </p:clrMapOvr>
-  <mc:AlternateContent xmlns:mc="http://schemas.openxmlformats.org/markup-compatibility/2006">
-    <mc:Choice xmlns:p14="http://schemas.microsoft.com/office/powerpoint/2010/main" Requires="p14">
+  <mc:AlternateContent xmlns:mc="http://schemas.openxmlformats.org/markup-compatibility/2006" xmlns:p14="http://schemas.microsoft.com/office/powerpoint/2010/main">
+    <mc:Choice Requires="p14">
       <p:transition spd="med" p14:dur="700">
         <p:fade/>
       </p:transition>
     </mc:Choice>
-    <mc:Fallback>
+    <mc:Fallback xmlns="">
       <p:transition spd="med">
         <p:fade/>
       </p:transition>
@@ -13573,6 +13754,162 @@
           </a:prstGeom>
         </p:spPr>
       </p:pic>
+      <p:sp>
+        <p:nvSpPr>
+          <p:cNvPr id="3" name="Rectangle 2">
+            <a:extLst>
+              <a:ext uri="{FF2B5EF4-FFF2-40B4-BE49-F238E27FC236}">
+                <a16:creationId xmlns:a16="http://schemas.microsoft.com/office/drawing/2014/main" id="{9A1F9A3A-9A55-4E21-B983-B94D47988BC5}"/>
+              </a:ext>
+            </a:extLst>
+          </p:cNvPr>
+          <p:cNvSpPr/>
+          <p:nvPr/>
+        </p:nvSpPr>
+        <p:spPr>
+          <a:xfrm>
+            <a:off x="1557028" y="5505450"/>
+            <a:ext cx="752475" cy="304800"/>
+          </a:xfrm>
+          <a:prstGeom prst="rect">
+            <a:avLst/>
+          </a:prstGeom>
+          <a:noFill/>
+          <a:ln>
+            <a:solidFill>
+              <a:srgbClr val="FF0000"/>
+            </a:solidFill>
+          </a:ln>
+        </p:spPr>
+        <p:style>
+          <a:lnRef idx="2">
+            <a:schemeClr val="accent1">
+              <a:shade val="50000"/>
+            </a:schemeClr>
+          </a:lnRef>
+          <a:fillRef idx="1">
+            <a:schemeClr val="accent1"/>
+          </a:fillRef>
+          <a:effectRef idx="0">
+            <a:schemeClr val="accent1"/>
+          </a:effectRef>
+          <a:fontRef idx="minor">
+            <a:schemeClr val="lt1"/>
+          </a:fontRef>
+        </p:style>
+        <p:txBody>
+          <a:bodyPr rtlCol="0" anchor="ctr"/>
+          <a:lstStyle/>
+          <a:p>
+            <a:pPr algn="ctr"/>
+            <a:endParaRPr lang="en-US"/>
+          </a:p>
+        </p:txBody>
+      </p:sp>
+      <p:sp>
+        <p:nvSpPr>
+          <p:cNvPr id="13" name="Rectangle 12">
+            <a:extLst>
+              <a:ext uri="{FF2B5EF4-FFF2-40B4-BE49-F238E27FC236}">
+                <a16:creationId xmlns:a16="http://schemas.microsoft.com/office/drawing/2014/main" id="{AF8A5FB6-2681-4996-8748-800D56C1807B}"/>
+              </a:ext>
+            </a:extLst>
+          </p:cNvPr>
+          <p:cNvSpPr/>
+          <p:nvPr/>
+        </p:nvSpPr>
+        <p:spPr>
+          <a:xfrm>
+            <a:off x="171843" y="6379115"/>
+            <a:ext cx="752475" cy="304800"/>
+          </a:xfrm>
+          <a:prstGeom prst="rect">
+            <a:avLst/>
+          </a:prstGeom>
+          <a:noFill/>
+          <a:ln>
+            <a:solidFill>
+              <a:srgbClr val="FF0000"/>
+            </a:solidFill>
+          </a:ln>
+        </p:spPr>
+        <p:style>
+          <a:lnRef idx="2">
+            <a:schemeClr val="accent1">
+              <a:shade val="50000"/>
+            </a:schemeClr>
+          </a:lnRef>
+          <a:fillRef idx="1">
+            <a:schemeClr val="accent1"/>
+          </a:fillRef>
+          <a:effectRef idx="0">
+            <a:schemeClr val="accent1"/>
+          </a:effectRef>
+          <a:fontRef idx="minor">
+            <a:schemeClr val="lt1"/>
+          </a:fontRef>
+        </p:style>
+        <p:txBody>
+          <a:bodyPr rtlCol="0" anchor="ctr"/>
+          <a:lstStyle/>
+          <a:p>
+            <a:pPr algn="ctr"/>
+            <a:endParaRPr lang="en-US"/>
+          </a:p>
+        </p:txBody>
+      </p:sp>
+      <p:sp>
+        <p:nvSpPr>
+          <p:cNvPr id="14" name="Rectangle 13">
+            <a:extLst>
+              <a:ext uri="{FF2B5EF4-FFF2-40B4-BE49-F238E27FC236}">
+                <a16:creationId xmlns:a16="http://schemas.microsoft.com/office/drawing/2014/main" id="{BA346C15-6BB9-46F0-A8ED-513A017BD6D0}"/>
+              </a:ext>
+            </a:extLst>
+          </p:cNvPr>
+          <p:cNvSpPr/>
+          <p:nvPr/>
+        </p:nvSpPr>
+        <p:spPr>
+          <a:xfrm>
+            <a:off x="7709584" y="5655215"/>
+            <a:ext cx="834341" cy="1028700"/>
+          </a:xfrm>
+          <a:prstGeom prst="rect">
+            <a:avLst/>
+          </a:prstGeom>
+          <a:noFill/>
+          <a:ln>
+            <a:solidFill>
+              <a:srgbClr val="FF0000"/>
+            </a:solidFill>
+          </a:ln>
+        </p:spPr>
+        <p:style>
+          <a:lnRef idx="2">
+            <a:schemeClr val="accent1">
+              <a:shade val="50000"/>
+            </a:schemeClr>
+          </a:lnRef>
+          <a:fillRef idx="1">
+            <a:schemeClr val="accent1"/>
+          </a:fillRef>
+          <a:effectRef idx="0">
+            <a:schemeClr val="accent1"/>
+          </a:effectRef>
+          <a:fontRef idx="minor">
+            <a:schemeClr val="lt1"/>
+          </a:fontRef>
+        </p:style>
+        <p:txBody>
+          <a:bodyPr rtlCol="0" anchor="ctr"/>
+          <a:lstStyle/>
+          <a:p>
+            <a:pPr algn="ctr"/>
+            <a:endParaRPr lang="en-US"/>
+          </a:p>
+        </p:txBody>
+      </p:sp>
     </p:spTree>
     <p:extLst>
       <p:ext uri="{BB962C8B-B14F-4D97-AF65-F5344CB8AC3E}">
@@ -13583,13 +13920,13 @@
   <p:clrMapOvr>
     <a:masterClrMapping/>
   </p:clrMapOvr>
-  <mc:AlternateContent xmlns:mc="http://schemas.openxmlformats.org/markup-compatibility/2006">
-    <mc:Choice xmlns:p14="http://schemas.microsoft.com/office/powerpoint/2010/main" Requires="p14">
+  <mc:AlternateContent xmlns:mc="http://schemas.openxmlformats.org/markup-compatibility/2006" xmlns:p14="http://schemas.microsoft.com/office/powerpoint/2010/main">
+    <mc:Choice Requires="p14">
       <p:transition spd="med" p14:dur="700">
         <p:fade/>
       </p:transition>
     </mc:Choice>
-    <mc:Fallback>
+    <mc:Fallback xmlns="">
       <p:transition spd="med">
         <p:fade/>
       </p:transition>
@@ -14173,7 +14510,7 @@
                             </p:stCondLst>
                             <p:childTnLst>
                               <p:par>
-                                <p:cTn id="42" presetID="10" presetClass="entr" presetSubtype="0" fill="hold" nodeType="clickEffect">
+                                <p:cTn id="42" presetID="42" presetClass="entr" presetSubtype="0" fill="hold" grpId="0" nodeType="clickEffect">
                                   <p:stCondLst>
                                     <p:cond delay="0"/>
                                   </p:stCondLst>
@@ -14186,7 +14523,7 @@
                                           </p:stCondLst>
                                         </p:cTn>
                                         <p:tgtEl>
-                                          <p:spTgt spid="11"/>
+                                          <p:spTgt spid="3"/>
                                         </p:tgtEl>
                                         <p:attrNameLst>
                                           <p:attrName>style.visibility</p:attrName>
@@ -14198,9 +14535,90 @@
                                     </p:set>
                                     <p:animEffect transition="in" filter="fade">
                                       <p:cBhvr>
-                                        <p:cTn id="44" dur="500"/>
-                                        <p:tgtEl>
-                                          <p:spTgt spid="11"/>
+                                        <p:cTn id="44" dur="1000"/>
+                                        <p:tgtEl>
+                                          <p:spTgt spid="3"/>
+                                        </p:tgtEl>
+                                      </p:cBhvr>
+                                    </p:animEffect>
+                                    <p:anim calcmode="lin" valueType="num">
+                                      <p:cBhvr>
+                                        <p:cTn id="45" dur="1000" fill="hold"/>
+                                        <p:tgtEl>
+                                          <p:spTgt spid="3"/>
+                                        </p:tgtEl>
+                                        <p:attrNameLst>
+                                          <p:attrName>ppt_x</p:attrName>
+                                        </p:attrNameLst>
+                                      </p:cBhvr>
+                                      <p:tavLst>
+                                        <p:tav tm="0">
+                                          <p:val>
+                                            <p:strVal val="#ppt_x"/>
+                                          </p:val>
+                                        </p:tav>
+                                        <p:tav tm="100000">
+                                          <p:val>
+                                            <p:strVal val="#ppt_x"/>
+                                          </p:val>
+                                        </p:tav>
+                                      </p:tavLst>
+                                    </p:anim>
+                                    <p:anim calcmode="lin" valueType="num">
+                                      <p:cBhvr>
+                                        <p:cTn id="46" dur="1000" fill="hold"/>
+                                        <p:tgtEl>
+                                          <p:spTgt spid="3"/>
+                                        </p:tgtEl>
+                                        <p:attrNameLst>
+                                          <p:attrName>ppt_y</p:attrName>
+                                        </p:attrNameLst>
+                                      </p:cBhvr>
+                                      <p:tavLst>
+                                        <p:tav tm="0">
+                                          <p:val>
+                                            <p:strVal val="#ppt_y+.1"/>
+                                          </p:val>
+                                        </p:tav>
+                                        <p:tav tm="100000">
+                                          <p:val>
+                                            <p:strVal val="#ppt_y"/>
+                                          </p:val>
+                                        </p:tav>
+                                      </p:tavLst>
+                                    </p:anim>
+                                  </p:childTnLst>
+                                </p:cTn>
+                              </p:par>
+                              <p:par>
+                                <p:cTn id="47" presetID="10" presetClass="entr" presetSubtype="0" fill="hold" grpId="0" nodeType="withEffect">
+                                  <p:stCondLst>
+                                    <p:cond delay="0"/>
+                                  </p:stCondLst>
+                                  <p:childTnLst>
+                                    <p:set>
+                                      <p:cBhvr>
+                                        <p:cTn id="48" dur="1" fill="hold">
+                                          <p:stCondLst>
+                                            <p:cond delay="0"/>
+                                          </p:stCondLst>
+                                        </p:cTn>
+                                        <p:tgtEl>
+                                          <p:spTgt spid="14"/>
+                                        </p:tgtEl>
+                                        <p:attrNameLst>
+                                          <p:attrName>style.visibility</p:attrName>
+                                        </p:attrNameLst>
+                                      </p:cBhvr>
+                                      <p:to>
+                                        <p:strVal val="visible"/>
+                                      </p:to>
+                                    </p:set>
+                                    <p:animEffect transition="in" filter="fade">
+                                      <p:cBhvr>
+                                        <p:cTn id="49" dur="500"/>
+                                        <p:tgtEl>
+                                          <p:spTgt spid="14"/>
                                         </p:tgtEl>
                                       </p:cBhvr>
                                     </p:animEffect>
@@ -14208,20 +14626,20 @@
                                 </p:cTn>
                               </p:par>
                               <p:par>
-                                <p:cTn id="45" presetID="10" presetClass="entr" presetSubtype="0" fill="hold" nodeType="withEffect">
+                                <p:cTn id="50" presetID="10" presetClass="entr" presetSubtype="0" fill="hold" grpId="0" nodeType="withEffect">
                                   <p:stCondLst>
                                     <p:cond delay="0"/>
                                   </p:stCondLst>
                                   <p:childTnLst>
                                     <p:set>
                                       <p:cBhvr>
-                                        <p:cTn id="46" dur="1" fill="hold">
+                                        <p:cTn id="51" dur="1" fill="hold">
                                           <p:stCondLst>
                                             <p:cond delay="0"/>
                                           </p:stCondLst>
                                         </p:cTn>
                                         <p:tgtEl>
-                                          <p:spTgt spid="31"/>
+                                          <p:spTgt spid="13"/>
                                         </p:tgtEl>
                                         <p:attrNameLst>
                                           <p:attrName>style.visibility</p:attrName>
@@ -14233,7 +14651,95 @@
                                     </p:set>
                                     <p:animEffect transition="in" filter="fade">
                                       <p:cBhvr>
-                                        <p:cTn id="47" dur="500"/>
+                                        <p:cTn id="52" dur="500"/>
+                                        <p:tgtEl>
+                                          <p:spTgt spid="13"/>
+                                        </p:tgtEl>
+                                      </p:cBhvr>
+                                    </p:animEffect>
+                                  </p:childTnLst>
+                                </p:cTn>
+                              </p:par>
+                            </p:childTnLst>
+                          </p:cTn>
+                        </p:par>
+                      </p:childTnLst>
+                    </p:cTn>
+                  </p:par>
+                  <p:par>
+                    <p:cTn id="53" fill="hold">
+                      <p:stCondLst>
+                        <p:cond delay="indefinite"/>
+                      </p:stCondLst>
+                      <p:childTnLst>
+                        <p:par>
+                          <p:cTn id="54" fill="hold">
+                            <p:stCondLst>
+                              <p:cond delay="0"/>
+                            </p:stCondLst>
+                            <p:childTnLst>
+                              <p:par>
+                                <p:cTn id="55" presetID="10" presetClass="entr" presetSubtype="0" fill="hold" nodeType="clickEffect">
+                                  <p:stCondLst>
+                                    <p:cond delay="0"/>
+                                  </p:stCondLst>
+                                  <p:childTnLst>
+                                    <p:set>
+                                      <p:cBhvr>
+                                        <p:cTn id="56" dur="1" fill="hold">
+                                          <p:stCondLst>
+                                            <p:cond delay="0"/>
+                                          </p:stCondLst>
+                                        </p:cTn>
+                                        <p:tgtEl>
+                                          <p:spTgt spid="11"/>
+                                        </p:tgtEl>
+                                        <p:attrNameLst>
+                                          <p:attrName>style.visibility</p:attrName>
+                                        </p:attrNameLst>
+                                      </p:cBhvr>
+                                      <p:to>
+                                        <p:strVal val="visible"/>
+                                      </p:to>
+                                    </p:set>
+                                    <p:animEffect transition="in" filter="fade">
+                                      <p:cBhvr>
+                                        <p:cTn id="57" dur="500"/>
+                                        <p:tgtEl>
+                                          <p:spTgt spid="11"/>
+                                        </p:tgtEl>
+                                      </p:cBhvr>
+                                    </p:animEffect>
+                                  </p:childTnLst>
+                                </p:cTn>
+                              </p:par>
+                              <p:par>
+                                <p:cTn id="58" presetID="10" presetClass="entr" presetSubtype="0" fill="hold" nodeType="withEffect">
+                                  <p:stCondLst>
+                                    <p:cond delay="0"/>
+                                  </p:stCondLst>
+                                  <p:childTnLst>
+                                    <p:set>
+                                      <p:cBhvr>
+                                        <p:cTn id="59" dur="1" fill="hold">
+                                          <p:stCondLst>
+                                            <p:cond delay="0"/>
+                                          </p:stCondLst>
+                                        </p:cTn>
+                                        <p:tgtEl>
+                                          <p:spTgt spid="31"/>
+                                        </p:tgtEl>
+                                        <p:attrNameLst>
+                                          <p:attrName>style.visibility</p:attrName>
+                                        </p:attrNameLst>
+                                      </p:cBhvr>
+                                      <p:to>
+                                        <p:strVal val="visible"/>
+                                      </p:to>
+                                    </p:set>
+                                    <p:animEffect transition="in" filter="fade">
+                                      <p:cBhvr>
+                                        <p:cTn id="60" dur="500"/>
                                         <p:tgtEl>
                                           <p:spTgt spid="31"/>
                                         </p:tgtEl>
@@ -14269,6 +14775,11 @@
         </p:cTn>
       </p:par>
     </p:tnLst>
+    <p:bldLst>
+      <p:bldP spid="3" grpId="0" animBg="1"/>
+      <p:bldP spid="13" grpId="0" animBg="1"/>
+      <p:bldP spid="14" grpId="0" animBg="1"/>
+    </p:bldLst>
   </p:timing>
 </p:sld>
 </file>
@@ -14692,13 +15203,13 @@
   <p:clrMapOvr>
     <a:masterClrMapping/>
   </p:clrMapOvr>
-  <mc:AlternateContent xmlns:mc="http://schemas.openxmlformats.org/markup-compatibility/2006">
-    <mc:Choice xmlns:p14="http://schemas.microsoft.com/office/powerpoint/2010/main" Requires="p14">
+  <mc:AlternateContent xmlns:mc="http://schemas.openxmlformats.org/markup-compatibility/2006" xmlns:p14="http://schemas.microsoft.com/office/powerpoint/2010/main">
+    <mc:Choice Requires="p14">
       <p:transition spd="med" p14:dur="700">
         <p:fade/>
       </p:transition>
     </mc:Choice>
-    <mc:Fallback>
+    <mc:Fallback xmlns="">
       <p:transition spd="med">
         <p:fade/>
       </p:transition>

</xml_diff>

<commit_message>
ppt update and test sequence unused
</commit_message>
<xml_diff>
--- a/P1 presentation.pptx
+++ b/P1 presentation.pptx
@@ -350,7 +350,7 @@
           <a:p>
             <a:fld id="{0A4C7DD1-2D06-47FD-80F0-DC791A43F5AA}" type="datetimeFigureOut">
               <a:rPr lang="en-US" smtClean="0"/>
-              <a:t>10/24/2021</a:t>
+              <a:t>10/25/2021</a:t>
             </a:fld>
             <a:endParaRPr lang="en-US"/>
           </a:p>
@@ -558,7 +558,7 @@
           <a:p>
             <a:fld id="{0A4C7DD1-2D06-47FD-80F0-DC791A43F5AA}" type="datetimeFigureOut">
               <a:rPr lang="en-US" smtClean="0"/>
-              <a:t>10/24/2021</a:t>
+              <a:t>10/25/2021</a:t>
             </a:fld>
             <a:endParaRPr lang="en-US"/>
           </a:p>
@@ -814,7 +814,7 @@
           <a:p>
             <a:fld id="{0A4C7DD1-2D06-47FD-80F0-DC791A43F5AA}" type="datetimeFigureOut">
               <a:rPr lang="en-US" smtClean="0"/>
-              <a:t>10/24/2021</a:t>
+              <a:t>10/25/2021</a:t>
             </a:fld>
             <a:endParaRPr lang="en-US"/>
           </a:p>
@@ -984,7 +984,7 @@
           <a:p>
             <a:fld id="{0A4C7DD1-2D06-47FD-80F0-DC791A43F5AA}" type="datetimeFigureOut">
               <a:rPr lang="en-US" smtClean="0"/>
-              <a:t>10/24/2021</a:t>
+              <a:t>10/25/2021</a:t>
             </a:fld>
             <a:endParaRPr lang="en-US"/>
           </a:p>
@@ -1327,7 +1327,7 @@
           <a:p>
             <a:fld id="{0A4C7DD1-2D06-47FD-80F0-DC791A43F5AA}" type="datetimeFigureOut">
               <a:rPr lang="en-US" smtClean="0"/>
-              <a:t>10/24/2021</a:t>
+              <a:t>10/25/2021</a:t>
             </a:fld>
             <a:endParaRPr lang="en-US"/>
           </a:p>
@@ -1602,7 +1602,7 @@
           <a:p>
             <a:fld id="{0A4C7DD1-2D06-47FD-80F0-DC791A43F5AA}" type="datetimeFigureOut">
               <a:rPr lang="en-US" smtClean="0"/>
-              <a:t>10/24/2021</a:t>
+              <a:t>10/25/2021</a:t>
             </a:fld>
             <a:endParaRPr lang="en-US"/>
           </a:p>
@@ -1981,7 +1981,7 @@
           <a:p>
             <a:fld id="{0A4C7DD1-2D06-47FD-80F0-DC791A43F5AA}" type="datetimeFigureOut">
               <a:rPr lang="en-US" smtClean="0"/>
-              <a:t>10/24/2021</a:t>
+              <a:t>10/25/2021</a:t>
             </a:fld>
             <a:endParaRPr lang="en-US"/>
           </a:p>
@@ -2099,7 +2099,7 @@
           <a:p>
             <a:fld id="{0A4C7DD1-2D06-47FD-80F0-DC791A43F5AA}" type="datetimeFigureOut">
               <a:rPr lang="en-US" smtClean="0"/>
-              <a:t>10/24/2021</a:t>
+              <a:t>10/25/2021</a:t>
             </a:fld>
             <a:endParaRPr lang="en-US"/>
           </a:p>
@@ -2270,7 +2270,7 @@
           <a:p>
             <a:fld id="{0A4C7DD1-2D06-47FD-80F0-DC791A43F5AA}" type="datetimeFigureOut">
               <a:rPr lang="en-US" smtClean="0"/>
-              <a:t>10/24/2021</a:t>
+              <a:t>10/25/2021</a:t>
             </a:fld>
             <a:endParaRPr lang="en-US"/>
           </a:p>
@@ -2624,7 +2624,7 @@
           <a:p>
             <a:fld id="{0A4C7DD1-2D06-47FD-80F0-DC791A43F5AA}" type="datetimeFigureOut">
               <a:rPr lang="en-US" smtClean="0"/>
-              <a:t>10/24/2021</a:t>
+              <a:t>10/25/2021</a:t>
             </a:fld>
             <a:endParaRPr lang="en-US"/>
           </a:p>
@@ -3001,7 +3001,7 @@
           <a:p>
             <a:fld id="{0A4C7DD1-2D06-47FD-80F0-DC791A43F5AA}" type="datetimeFigureOut">
               <a:rPr lang="en-US" smtClean="0"/>
-              <a:t>10/24/2021</a:t>
+              <a:t>10/25/2021</a:t>
             </a:fld>
             <a:endParaRPr lang="en-US"/>
           </a:p>
@@ -3288,7 +3288,7 @@
           <a:p>
             <a:fld id="{0A4C7DD1-2D06-47FD-80F0-DC791A43F5AA}" type="datetimeFigureOut">
               <a:rPr lang="en-US" smtClean="0"/>
-              <a:t>10/24/2021</a:t>
+              <a:t>10/25/2021</a:t>
             </a:fld>
             <a:endParaRPr lang="en-US"/>
           </a:p>
@@ -5193,13 +5193,13 @@
   <p:clrMapOvr>
     <a:masterClrMapping/>
   </p:clrMapOvr>
-  <mc:AlternateContent xmlns:mc="http://schemas.openxmlformats.org/markup-compatibility/2006">
-    <mc:Choice xmlns:p14="http://schemas.microsoft.com/office/powerpoint/2010/main" Requires="p14">
+  <mc:AlternateContent xmlns:mc="http://schemas.openxmlformats.org/markup-compatibility/2006" xmlns:p14="http://schemas.microsoft.com/office/powerpoint/2010/main">
+    <mc:Choice Requires="p14">
       <p:transition spd="med" p14:dur="700">
         <p:fade/>
       </p:transition>
     </mc:Choice>
-    <mc:Fallback>
+    <mc:Fallback xmlns="">
       <p:transition spd="med">
         <p:fade/>
       </p:transition>
@@ -12040,15 +12040,15 @@
                   <a:srgbClr val="FFFFFF"/>
                 </a:solidFill>
               </a:rPr>
-              <a:t>Shopping cart per client is calculated in </a:t>
-            </a:r>
-            <a:r>
-              <a:rPr lang="en-US" sz="3600" dirty="0" err="1">
+              <a:t>Shopping cart per client is calculated </a:t>
+            </a:r>
+            <a:r>
+              <a:rPr lang="en-US" sz="3600">
                 <a:solidFill>
                   <a:srgbClr val="FFFFFF"/>
                 </a:solidFill>
               </a:rPr>
-              <a:t>Uipath</a:t>
+              <a:t>in UiPath </a:t>
             </a:r>
             <a:r>
               <a:rPr lang="en-US" sz="3600" dirty="0">
@@ -12056,7 +12056,7 @@
                   <a:srgbClr val="FFFFFF"/>
                 </a:solidFill>
               </a:rPr>
-              <a:t> to increase automation speed</a:t>
+              <a:t>to increase automation speed</a:t>
             </a:r>
           </a:p>
         </p:txBody>

</xml_diff>